<commit_message>
shopping cart documents initial commit
</commit_message>
<xml_diff>
--- a/Docs/ShoppingCart.pptx
+++ b/Docs/ShoppingCart.pptx
@@ -14,6 +14,9 @@
     <p:sldId id="262" r:id="rId8"/>
     <p:sldId id="263" r:id="rId9"/>
     <p:sldId id="264" r:id="rId10"/>
+    <p:sldId id="265" r:id="rId11"/>
+    <p:sldId id="266" r:id="rId12"/>
+    <p:sldId id="267" r:id="rId13"/>
   </p:sldIdLst>
   <p:sldSz cx="12192000" cy="6858000"/>
   <p:notesSz cx="6858000" cy="9144000"/>
@@ -112,6 +115,11 @@
       </a:defRPr>
     </a:lvl9pPr>
   </p:defaultTextStyle>
+  <p:extLst>
+    <p:ext uri="{EFAFB233-063F-42B5-8137-9DF3F51BA10A}">
+      <p15:sldGuideLst xmlns:p15="http://schemas.microsoft.com/office/powerpoint/2012/main"/>
+    </p:ext>
+  </p:extLst>
 </p:presentation>
 </file>
 
@@ -283,7 +291,7 @@
           <a:p>
             <a:fld id="{FC0E3BE2-2296-44B4-87B8-79CBB784B606}" type="datetimeFigureOut">
               <a:rPr lang="en-US" smtClean="0"/>
-              <a:t>6/9/2020</a:t>
+              <a:t>6/11/2020</a:t>
             </a:fld>
             <a:endParaRPr lang="en-US"/>
           </a:p>
@@ -511,7 +519,7 @@
           <a:p>
             <a:fld id="{FC0E3BE2-2296-44B4-87B8-79CBB784B606}" type="datetimeFigureOut">
               <a:rPr lang="en-US" smtClean="0"/>
-              <a:t>6/9/2020</a:t>
+              <a:t>6/11/2020</a:t>
             </a:fld>
             <a:endParaRPr lang="en-US"/>
           </a:p>
@@ -691,7 +699,7 @@
           <a:p>
             <a:fld id="{FC0E3BE2-2296-44B4-87B8-79CBB784B606}" type="datetimeFigureOut">
               <a:rPr lang="en-US" smtClean="0"/>
-              <a:t>6/9/2020</a:t>
+              <a:t>6/11/2020</a:t>
             </a:fld>
             <a:endParaRPr lang="en-US"/>
           </a:p>
@@ -861,7 +869,7 @@
           <a:p>
             <a:fld id="{FC0E3BE2-2296-44B4-87B8-79CBB784B606}" type="datetimeFigureOut">
               <a:rPr lang="en-US" smtClean="0"/>
-              <a:t>6/9/2020</a:t>
+              <a:t>6/11/2020</a:t>
             </a:fld>
             <a:endParaRPr lang="en-US"/>
           </a:p>
@@ -1115,7 +1123,7 @@
           <a:p>
             <a:fld id="{FC0E3BE2-2296-44B4-87B8-79CBB784B606}" type="datetimeFigureOut">
               <a:rPr lang="en-US" smtClean="0"/>
-              <a:t>6/9/2020</a:t>
+              <a:t>6/11/2020</a:t>
             </a:fld>
             <a:endParaRPr lang="en-US"/>
           </a:p>
@@ -1441,7 +1449,7 @@
           <a:p>
             <a:fld id="{FC0E3BE2-2296-44B4-87B8-79CBB784B606}" type="datetimeFigureOut">
               <a:rPr lang="en-US" smtClean="0"/>
-              <a:t>6/9/2020</a:t>
+              <a:t>6/11/2020</a:t>
             </a:fld>
             <a:endParaRPr lang="en-US"/>
           </a:p>
@@ -1892,7 +1900,7 @@
           <a:p>
             <a:fld id="{FC0E3BE2-2296-44B4-87B8-79CBB784B606}" type="datetimeFigureOut">
               <a:rPr lang="en-US" smtClean="0"/>
-              <a:t>6/9/2020</a:t>
+              <a:t>6/11/2020</a:t>
             </a:fld>
             <a:endParaRPr lang="en-US"/>
           </a:p>
@@ -2010,7 +2018,7 @@
           <a:p>
             <a:fld id="{FC0E3BE2-2296-44B4-87B8-79CBB784B606}" type="datetimeFigureOut">
               <a:rPr lang="en-US" smtClean="0"/>
-              <a:t>6/9/2020</a:t>
+              <a:t>6/11/2020</a:t>
             </a:fld>
             <a:endParaRPr lang="en-US"/>
           </a:p>
@@ -2105,7 +2113,7 @@
           <a:p>
             <a:fld id="{FC0E3BE2-2296-44B4-87B8-79CBB784B606}" type="datetimeFigureOut">
               <a:rPr lang="en-US" smtClean="0"/>
-              <a:t>6/9/2020</a:t>
+              <a:t>6/11/2020</a:t>
             </a:fld>
             <a:endParaRPr lang="en-US"/>
           </a:p>
@@ -2392,7 +2400,7 @@
           <a:p>
             <a:fld id="{FC0E3BE2-2296-44B4-87B8-79CBB784B606}" type="datetimeFigureOut">
               <a:rPr lang="en-US" smtClean="0"/>
-              <a:t>6/9/2020</a:t>
+              <a:t>6/11/2020</a:t>
             </a:fld>
             <a:endParaRPr lang="en-US"/>
           </a:p>
@@ -2714,7 +2722,7 @@
           <a:p>
             <a:fld id="{FC0E3BE2-2296-44B4-87B8-79CBB784B606}" type="datetimeFigureOut">
               <a:rPr lang="en-US" smtClean="0"/>
-              <a:t>6/9/2020</a:t>
+              <a:t>6/11/2020</a:t>
             </a:fld>
             <a:endParaRPr lang="en-US"/>
           </a:p>
@@ -2968,7 +2976,7 @@
           <a:p>
             <a:fld id="{FC0E3BE2-2296-44B4-87B8-79CBB784B606}" type="datetimeFigureOut">
               <a:rPr lang="en-US" smtClean="0"/>
-              <a:t>6/9/2020</a:t>
+              <a:t>6/11/2020</a:t>
             </a:fld>
             <a:endParaRPr lang="en-US"/>
           </a:p>
@@ -3526,6 +3534,271 @@
 </p:sld>
 </file>
 
+<file path=ppt/slides/slide10.xml><?xml version="1.0" encoding="utf-8"?>
+<p:sld xmlns:a="http://schemas.openxmlformats.org/drawingml/2006/main" xmlns:r="http://schemas.openxmlformats.org/officeDocument/2006/relationships" xmlns:p="http://schemas.openxmlformats.org/presentationml/2006/main">
+  <p:cSld>
+    <p:spTree>
+      <p:nvGrpSpPr>
+        <p:cNvPr id="1" name=""/>
+        <p:cNvGrpSpPr/>
+        <p:nvPr/>
+      </p:nvGrpSpPr>
+      <p:grpSpPr>
+        <a:xfrm>
+          <a:off x="0" y="0"/>
+          <a:ext cx="0" cy="0"/>
+          <a:chOff x="0" y="0"/>
+          <a:chExt cx="0" cy="0"/>
+        </a:xfrm>
+      </p:grpSpPr>
+      <p:pic>
+        <p:nvPicPr>
+          <p:cNvPr id="4" name="Content Placeholder 3"/>
+          <p:cNvPicPr>
+            <a:picLocks noGrp="1" noChangeAspect="1"/>
+          </p:cNvPicPr>
+          <p:nvPr>
+            <p:ph idx="1"/>
+          </p:nvPr>
+        </p:nvPicPr>
+        <p:blipFill rotWithShape="1">
+          <a:blip r:embed="rId2"/>
+          <a:srcRect t="2275" b="586"/>
+          <a:stretch/>
+        </p:blipFill>
+        <p:spPr>
+          <a:xfrm>
+            <a:off x="4063011" y="772134"/>
+            <a:ext cx="4405128" cy="6138874"/>
+          </a:xfrm>
+          <a:prstGeom prst="rect">
+            <a:avLst/>
+          </a:prstGeom>
+        </p:spPr>
+      </p:pic>
+      <p:sp>
+        <p:nvSpPr>
+          <p:cNvPr id="2" name="Title 1"/>
+          <p:cNvSpPr>
+            <a:spLocks noGrp="1"/>
+          </p:cNvSpPr>
+          <p:nvPr>
+            <p:ph type="title"/>
+          </p:nvPr>
+        </p:nvSpPr>
+        <p:spPr>
+          <a:xfrm>
+            <a:off x="424070" y="-410813"/>
+            <a:ext cx="9692640" cy="1325562"/>
+          </a:xfrm>
+        </p:spPr>
+        <p:txBody>
+          <a:bodyPr/>
+          <a:lstStyle/>
+          <a:p>
+            <a:r>
+              <a:rPr lang="en-US" dirty="0"/>
+              <a:t>Customer </a:t>
+            </a:r>
+            <a:r>
+              <a:rPr lang="en-US" dirty="0" smtClean="0"/>
+              <a:t>Registration</a:t>
+            </a:r>
+            <a:endParaRPr lang="en-US" dirty="0"/>
+          </a:p>
+        </p:txBody>
+      </p:sp>
+    </p:spTree>
+    <p:extLst>
+      <p:ext uri="{BB962C8B-B14F-4D97-AF65-F5344CB8AC3E}">
+        <p14:creationId xmlns:p14="http://schemas.microsoft.com/office/powerpoint/2010/main" val="3679955805"/>
+      </p:ext>
+    </p:extLst>
+  </p:cSld>
+  <p:clrMapOvr>
+    <a:masterClrMapping/>
+  </p:clrMapOvr>
+</p:sld>
+</file>
+
+<file path=ppt/slides/slide11.xml><?xml version="1.0" encoding="utf-8"?>
+<p:sld xmlns:a="http://schemas.openxmlformats.org/drawingml/2006/main" xmlns:r="http://schemas.openxmlformats.org/officeDocument/2006/relationships" xmlns:p="http://schemas.openxmlformats.org/presentationml/2006/main">
+  <p:cSld>
+    <p:spTree>
+      <p:nvGrpSpPr>
+        <p:cNvPr id="1" name=""/>
+        <p:cNvGrpSpPr/>
+        <p:nvPr/>
+      </p:nvGrpSpPr>
+      <p:grpSpPr>
+        <a:xfrm>
+          <a:off x="0" y="0"/>
+          <a:ext cx="0" cy="0"/>
+          <a:chOff x="0" y="0"/>
+          <a:chExt cx="0" cy="0"/>
+        </a:xfrm>
+      </p:grpSpPr>
+      <p:sp>
+        <p:nvSpPr>
+          <p:cNvPr id="2" name="Title 1"/>
+          <p:cNvSpPr>
+            <a:spLocks noGrp="1"/>
+          </p:cNvSpPr>
+          <p:nvPr>
+            <p:ph type="title"/>
+          </p:nvPr>
+        </p:nvSpPr>
+        <p:spPr>
+          <a:xfrm>
+            <a:off x="1341386" y="-124571"/>
+            <a:ext cx="9692640" cy="1325562"/>
+          </a:xfrm>
+        </p:spPr>
+        <p:txBody>
+          <a:bodyPr/>
+          <a:lstStyle/>
+          <a:p>
+            <a:r>
+              <a:rPr lang="en-US" dirty="0" smtClean="0"/>
+              <a:t>Staff Registration</a:t>
+            </a:r>
+            <a:endParaRPr lang="en-US" dirty="0"/>
+          </a:p>
+        </p:txBody>
+      </p:sp>
+      <p:pic>
+        <p:nvPicPr>
+          <p:cNvPr id="4" name="Content Placeholder 3"/>
+          <p:cNvPicPr>
+            <a:picLocks noGrp="1" noChangeAspect="1"/>
+          </p:cNvPicPr>
+          <p:nvPr>
+            <p:ph idx="1"/>
+          </p:nvPr>
+        </p:nvPicPr>
+        <p:blipFill>
+          <a:blip r:embed="rId2">
+            <a:extLst>
+              <a:ext uri="{28A0092B-C50C-407E-A947-70E740481C1C}">
+                <a14:useLocalDpi xmlns:a14="http://schemas.microsoft.com/office/drawing/2010/main" val="0"/>
+              </a:ext>
+            </a:extLst>
+          </a:blip>
+          <a:stretch>
+            <a:fillRect/>
+          </a:stretch>
+        </p:blipFill>
+        <p:spPr>
+          <a:xfrm>
+            <a:off x="3110072" y="1033671"/>
+            <a:ext cx="4867737" cy="5904034"/>
+          </a:xfrm>
+        </p:spPr>
+      </p:pic>
+    </p:spTree>
+    <p:extLst>
+      <p:ext uri="{BB962C8B-B14F-4D97-AF65-F5344CB8AC3E}">
+        <p14:creationId xmlns:p14="http://schemas.microsoft.com/office/powerpoint/2010/main" val="1478987722"/>
+      </p:ext>
+    </p:extLst>
+  </p:cSld>
+  <p:clrMapOvr>
+    <a:masterClrMapping/>
+  </p:clrMapOvr>
+  <p:timing>
+    <p:tnLst>
+      <p:par>
+        <p:cTn id="1" dur="indefinite" restart="never" nodeType="tmRoot"/>
+      </p:par>
+    </p:tnLst>
+  </p:timing>
+</p:sld>
+</file>
+
+<file path=ppt/slides/slide12.xml><?xml version="1.0" encoding="utf-8"?>
+<p:sld xmlns:a="http://schemas.openxmlformats.org/drawingml/2006/main" xmlns:r="http://schemas.openxmlformats.org/officeDocument/2006/relationships" xmlns:p="http://schemas.openxmlformats.org/presentationml/2006/main">
+  <p:cSld>
+    <p:spTree>
+      <p:nvGrpSpPr>
+        <p:cNvPr id="1" name=""/>
+        <p:cNvGrpSpPr/>
+        <p:nvPr/>
+      </p:nvGrpSpPr>
+      <p:grpSpPr>
+        <a:xfrm>
+          <a:off x="0" y="0"/>
+          <a:ext cx="0" cy="0"/>
+          <a:chOff x="0" y="0"/>
+          <a:chExt cx="0" cy="0"/>
+        </a:xfrm>
+      </p:grpSpPr>
+      <p:sp>
+        <p:nvSpPr>
+          <p:cNvPr id="2" name="Title 1"/>
+          <p:cNvSpPr>
+            <a:spLocks noGrp="1"/>
+          </p:cNvSpPr>
+          <p:nvPr>
+            <p:ph type="title"/>
+          </p:nvPr>
+        </p:nvSpPr>
+        <p:spPr>
+          <a:xfrm>
+            <a:off x="917315" y="0"/>
+            <a:ext cx="9692640" cy="1325562"/>
+          </a:xfrm>
+        </p:spPr>
+        <p:txBody>
+          <a:bodyPr/>
+          <a:lstStyle/>
+          <a:p>
+            <a:r>
+              <a:rPr lang="en-US" dirty="0" smtClean="0"/>
+              <a:t>Product List</a:t>
+            </a:r>
+            <a:endParaRPr lang="en-US" dirty="0"/>
+          </a:p>
+        </p:txBody>
+      </p:sp>
+      <p:pic>
+        <p:nvPicPr>
+          <p:cNvPr id="4" name="Content Placeholder 3"/>
+          <p:cNvPicPr>
+            <a:picLocks noGrp="1" noChangeAspect="1"/>
+          </p:cNvPicPr>
+          <p:nvPr>
+            <p:ph idx="1"/>
+          </p:nvPr>
+        </p:nvPicPr>
+        <p:blipFill>
+          <a:blip r:embed="rId2"/>
+          <a:stretch>
+            <a:fillRect/>
+          </a:stretch>
+        </p:blipFill>
+        <p:spPr>
+          <a:xfrm>
+            <a:off x="4527029" y="106017"/>
+            <a:ext cx="4868761" cy="6612678"/>
+          </a:xfrm>
+          <a:prstGeom prst="rect">
+            <a:avLst/>
+          </a:prstGeom>
+        </p:spPr>
+      </p:pic>
+    </p:spTree>
+    <p:extLst>
+      <p:ext uri="{BB962C8B-B14F-4D97-AF65-F5344CB8AC3E}">
+        <p14:creationId xmlns:p14="http://schemas.microsoft.com/office/powerpoint/2010/main" val="729169925"/>
+      </p:ext>
+    </p:extLst>
+  </p:cSld>
+  <p:clrMapOvr>
+    <a:masterClrMapping/>
+  </p:clrMapOvr>
+</p:sld>
+</file>
+
 <file path=ppt/slides/slide2.xml><?xml version="1.0" encoding="utf-8"?>
 <p:sld xmlns:a="http://schemas.openxmlformats.org/drawingml/2006/main" xmlns:r="http://schemas.openxmlformats.org/officeDocument/2006/relationships" xmlns:p="http://schemas.openxmlformats.org/presentationml/2006/main">
   <p:cSld>
@@ -3553,7 +3826,12 @@
             <p:ph type="title"/>
           </p:nvPr>
         </p:nvSpPr>
-        <p:spPr/>
+        <p:spPr>
+          <a:xfrm>
+            <a:off x="1261872" y="0"/>
+            <a:ext cx="9692640" cy="1325562"/>
+          </a:xfrm>
+        </p:spPr>
         <p:txBody>
           <a:bodyPr/>
           <a:lstStyle/>
@@ -3576,7 +3854,12 @@
             <p:ph idx="1"/>
           </p:nvPr>
         </p:nvSpPr>
-        <p:spPr/>
+        <p:spPr>
+          <a:xfrm>
+            <a:off x="1261872" y="1325562"/>
+            <a:ext cx="8595360" cy="4854575"/>
+          </a:xfrm>
+        </p:spPr>
         <p:txBody>
           <a:bodyPr/>
           <a:lstStyle/>
@@ -3633,16 +3916,84 @@
             <a:pPr lvl="1"/>
             <a:r>
               <a:rPr lang="en-US" dirty="0"/>
-              <a:t>Reset </a:t>
-            </a:r>
-            <a:r>
-              <a:rPr lang="en-US" dirty="0"/>
-              <a:t>Password page</a:t>
-            </a:r>
-          </a:p>
-          <a:p>
-            <a:pPr lvl="1"/>
+              <a:t>Reset Password </a:t>
+            </a:r>
+            <a:r>
+              <a:rPr lang="en-US" dirty="0" smtClean="0"/>
+              <a:t>page</a:t>
+            </a:r>
             <a:endParaRPr lang="en-US" dirty="0"/>
+          </a:p>
+          <a:p>
+            <a:pPr marL="182880" lvl="1">
+              <a:lnSpc>
+                <a:spcPct val="95000"/>
+              </a:lnSpc>
+              <a:spcBef>
+                <a:spcPts val="1400"/>
+              </a:spcBef>
+              <a:spcAft>
+                <a:spcPts val="200"/>
+              </a:spcAft>
+              <a:buSzPct val="80000"/>
+              <a:buFont typeface="Arial" pitchFamily="34" charset="0"/>
+              <a:buChar char="•"/>
+            </a:pPr>
+            <a:r>
+              <a:rPr lang="en-US" sz="1800" spc="10" dirty="0" smtClean="0">
+                <a:solidFill>
+                  <a:schemeClr val="tx1"/>
+                </a:solidFill>
+              </a:rPr>
+              <a:t>Member Registration Design</a:t>
+            </a:r>
+          </a:p>
+          <a:p>
+            <a:pPr lvl="1">
+              <a:buSzPct val="80000"/>
+            </a:pPr>
+            <a:r>
+              <a:rPr lang="en-US" dirty="0" smtClean="0"/>
+              <a:t>Customer Registration</a:t>
+            </a:r>
+          </a:p>
+          <a:p>
+            <a:pPr lvl="1">
+              <a:buSzPct val="80000"/>
+            </a:pPr>
+            <a:r>
+              <a:rPr lang="en-US" dirty="0" smtClean="0"/>
+              <a:t>Staff </a:t>
+            </a:r>
+            <a:r>
+              <a:rPr lang="en-US" dirty="0" smtClean="0"/>
+              <a:t>Registration</a:t>
+            </a:r>
+            <a:endParaRPr lang="en-US" dirty="0"/>
+          </a:p>
+          <a:p>
+            <a:pPr marL="182880" lvl="1">
+              <a:lnSpc>
+                <a:spcPct val="95000"/>
+              </a:lnSpc>
+              <a:spcBef>
+                <a:spcPts val="1400"/>
+              </a:spcBef>
+              <a:spcAft>
+                <a:spcPts val="200"/>
+              </a:spcAft>
+              <a:buSzPct val="80000"/>
+              <a:buFont typeface="Arial" pitchFamily="34" charset="0"/>
+              <a:buChar char="•"/>
+            </a:pPr>
+            <a:r>
+              <a:rPr lang="en-US" sz="1800" spc="10" dirty="0">
+                <a:solidFill>
+                  <a:schemeClr val="tx1"/>
+                </a:solidFill>
+              </a:rPr>
+              <a:t>Product List</a:t>
+            </a:r>
           </a:p>
         </p:txBody>
       </p:sp>
@@ -3676,37 +4027,9 @@
           <a:chExt cx="0" cy="0"/>
         </a:xfrm>
       </p:grpSpPr>
-      <p:sp>
-        <p:nvSpPr>
-          <p:cNvPr id="2" name="Title 1"/>
-          <p:cNvSpPr>
-            <a:spLocks noGrp="1"/>
-          </p:cNvSpPr>
-          <p:nvPr>
-            <p:ph type="title"/>
-          </p:nvPr>
-        </p:nvSpPr>
-        <p:spPr>
-          <a:xfrm>
-            <a:off x="1261872" y="213360"/>
-            <a:ext cx="9692640" cy="1325562"/>
-          </a:xfrm>
-        </p:spPr>
-        <p:txBody>
-          <a:bodyPr/>
-          <a:lstStyle/>
-          <a:p>
-            <a:r>
-              <a:rPr lang="en-US" dirty="0" smtClean="0"/>
-              <a:t>ER Diagram</a:t>
-            </a:r>
-            <a:endParaRPr lang="en-US" dirty="0"/>
-          </a:p>
-        </p:txBody>
-      </p:sp>
       <p:pic>
         <p:nvPicPr>
-          <p:cNvPr id="4" name="Content Placeholder 3"/>
+          <p:cNvPr id="5" name="Content Placeholder 4"/>
           <p:cNvPicPr>
             <a:picLocks noGrp="1" noChangeAspect="1"/>
           </p:cNvPicPr>
@@ -3728,11 +4051,39 @@
         </p:blipFill>
         <p:spPr>
           <a:xfrm>
-            <a:off x="2764254" y="1511299"/>
-            <a:ext cx="6697246" cy="5212915"/>
+            <a:off x="3702342" y="176701"/>
+            <a:ext cx="6303049" cy="6421976"/>
           </a:xfrm>
         </p:spPr>
       </p:pic>
+      <p:sp>
+        <p:nvSpPr>
+          <p:cNvPr id="2" name="Title 1"/>
+          <p:cNvSpPr>
+            <a:spLocks noGrp="1"/>
+          </p:cNvSpPr>
+          <p:nvPr>
+            <p:ph type="title"/>
+          </p:nvPr>
+        </p:nvSpPr>
+        <p:spPr>
+          <a:xfrm>
+            <a:off x="970324" y="0"/>
+            <a:ext cx="9692640" cy="1325562"/>
+          </a:xfrm>
+        </p:spPr>
+        <p:txBody>
+          <a:bodyPr/>
+          <a:lstStyle/>
+          <a:p>
+            <a:r>
+              <a:rPr lang="en-US" dirty="0" smtClean="0"/>
+              <a:t>ER Diagram</a:t>
+            </a:r>
+            <a:endParaRPr lang="en-US" dirty="0"/>
+          </a:p>
+        </p:txBody>
+      </p:sp>
     </p:spTree>
     <p:extLst>
       <p:ext uri="{BB962C8B-B14F-4D97-AF65-F5344CB8AC3E}">
@@ -3874,8 +4225,8 @@
         </p:blipFill>
         <p:spPr>
           <a:xfrm>
-            <a:off x="4181436" y="227683"/>
-            <a:ext cx="5127664" cy="6447755"/>
+            <a:off x="4229371" y="0"/>
+            <a:ext cx="5590489" cy="6828338"/>
           </a:xfrm>
         </p:spPr>
       </p:pic>
@@ -3891,7 +4242,7 @@
         </p:nvSpPr>
         <p:spPr>
           <a:xfrm>
-            <a:off x="576072" y="0"/>
+            <a:off x="576072" y="-106016"/>
             <a:ext cx="9692640" cy="1325562"/>
           </a:xfrm>
         </p:spPr>

</xml_diff>

<commit_message>
Shopping cart project initial commit
</commit_message>
<xml_diff>
--- a/Docs/ShoppingCart.pptx
+++ b/Docs/ShoppingCart.pptx
@@ -11,12 +11,15 @@
     <p:sldId id="259" r:id="rId5"/>
     <p:sldId id="260" r:id="rId6"/>
     <p:sldId id="261" r:id="rId7"/>
-    <p:sldId id="262" r:id="rId8"/>
-    <p:sldId id="263" r:id="rId9"/>
-    <p:sldId id="264" r:id="rId10"/>
-    <p:sldId id="265" r:id="rId11"/>
-    <p:sldId id="266" r:id="rId12"/>
-    <p:sldId id="267" r:id="rId13"/>
+    <p:sldId id="268" r:id="rId8"/>
+    <p:sldId id="262" r:id="rId9"/>
+    <p:sldId id="263" r:id="rId10"/>
+    <p:sldId id="264" r:id="rId11"/>
+    <p:sldId id="265" r:id="rId12"/>
+    <p:sldId id="266" r:id="rId13"/>
+    <p:sldId id="267" r:id="rId14"/>
+    <p:sldId id="269" r:id="rId15"/>
+    <p:sldId id="270" r:id="rId16"/>
   </p:sldIdLst>
   <p:sldSz cx="12192000" cy="6858000"/>
   <p:notesSz cx="6858000" cy="9144000"/>
@@ -291,7 +294,7 @@
           <a:p>
             <a:fld id="{FC0E3BE2-2296-44B4-87B8-79CBB784B606}" type="datetimeFigureOut">
               <a:rPr lang="en-US" smtClean="0"/>
-              <a:t>6/11/2020</a:t>
+              <a:t>6/15/2020</a:t>
             </a:fld>
             <a:endParaRPr lang="en-US"/>
           </a:p>
@@ -519,7 +522,7 @@
           <a:p>
             <a:fld id="{FC0E3BE2-2296-44B4-87B8-79CBB784B606}" type="datetimeFigureOut">
               <a:rPr lang="en-US" smtClean="0"/>
-              <a:t>6/11/2020</a:t>
+              <a:t>6/15/2020</a:t>
             </a:fld>
             <a:endParaRPr lang="en-US"/>
           </a:p>
@@ -699,7 +702,7 @@
           <a:p>
             <a:fld id="{FC0E3BE2-2296-44B4-87B8-79CBB784B606}" type="datetimeFigureOut">
               <a:rPr lang="en-US" smtClean="0"/>
-              <a:t>6/11/2020</a:t>
+              <a:t>6/15/2020</a:t>
             </a:fld>
             <a:endParaRPr lang="en-US"/>
           </a:p>
@@ -869,7 +872,7 @@
           <a:p>
             <a:fld id="{FC0E3BE2-2296-44B4-87B8-79CBB784B606}" type="datetimeFigureOut">
               <a:rPr lang="en-US" smtClean="0"/>
-              <a:t>6/11/2020</a:t>
+              <a:t>6/15/2020</a:t>
             </a:fld>
             <a:endParaRPr lang="en-US"/>
           </a:p>
@@ -1123,7 +1126,7 @@
           <a:p>
             <a:fld id="{FC0E3BE2-2296-44B4-87B8-79CBB784B606}" type="datetimeFigureOut">
               <a:rPr lang="en-US" smtClean="0"/>
-              <a:t>6/11/2020</a:t>
+              <a:t>6/15/2020</a:t>
             </a:fld>
             <a:endParaRPr lang="en-US"/>
           </a:p>
@@ -1449,7 +1452,7 @@
           <a:p>
             <a:fld id="{FC0E3BE2-2296-44B4-87B8-79CBB784B606}" type="datetimeFigureOut">
               <a:rPr lang="en-US" smtClean="0"/>
-              <a:t>6/11/2020</a:t>
+              <a:t>6/15/2020</a:t>
             </a:fld>
             <a:endParaRPr lang="en-US"/>
           </a:p>
@@ -1900,7 +1903,7 @@
           <a:p>
             <a:fld id="{FC0E3BE2-2296-44B4-87B8-79CBB784B606}" type="datetimeFigureOut">
               <a:rPr lang="en-US" smtClean="0"/>
-              <a:t>6/11/2020</a:t>
+              <a:t>6/15/2020</a:t>
             </a:fld>
             <a:endParaRPr lang="en-US"/>
           </a:p>
@@ -2018,7 +2021,7 @@
           <a:p>
             <a:fld id="{FC0E3BE2-2296-44B4-87B8-79CBB784B606}" type="datetimeFigureOut">
               <a:rPr lang="en-US" smtClean="0"/>
-              <a:t>6/11/2020</a:t>
+              <a:t>6/15/2020</a:t>
             </a:fld>
             <a:endParaRPr lang="en-US"/>
           </a:p>
@@ -2113,7 +2116,7 @@
           <a:p>
             <a:fld id="{FC0E3BE2-2296-44B4-87B8-79CBB784B606}" type="datetimeFigureOut">
               <a:rPr lang="en-US" smtClean="0"/>
-              <a:t>6/11/2020</a:t>
+              <a:t>6/15/2020</a:t>
             </a:fld>
             <a:endParaRPr lang="en-US"/>
           </a:p>
@@ -2400,7 +2403,7 @@
           <a:p>
             <a:fld id="{FC0E3BE2-2296-44B4-87B8-79CBB784B606}" type="datetimeFigureOut">
               <a:rPr lang="en-US" smtClean="0"/>
-              <a:t>6/11/2020</a:t>
+              <a:t>6/15/2020</a:t>
             </a:fld>
             <a:endParaRPr lang="en-US"/>
           </a:p>
@@ -2722,7 +2725,7 @@
           <a:p>
             <a:fld id="{FC0E3BE2-2296-44B4-87B8-79CBB784B606}" type="datetimeFigureOut">
               <a:rPr lang="en-US" smtClean="0"/>
-              <a:t>6/11/2020</a:t>
+              <a:t>6/15/2020</a:t>
             </a:fld>
             <a:endParaRPr lang="en-US"/>
           </a:p>
@@ -2976,7 +2979,7 @@
           <a:p>
             <a:fld id="{FC0E3BE2-2296-44B4-87B8-79CBB784B606}" type="datetimeFigureOut">
               <a:rPr lang="en-US" smtClean="0"/>
-              <a:t>6/11/2020</a:t>
+              <a:t>6/15/2020</a:t>
             </a:fld>
             <a:endParaRPr lang="en-US"/>
           </a:p>
@@ -3551,6 +3554,93 @@
           <a:chExt cx="0" cy="0"/>
         </a:xfrm>
       </p:grpSpPr>
+      <p:sp>
+        <p:nvSpPr>
+          <p:cNvPr id="2" name="Title 1"/>
+          <p:cNvSpPr>
+            <a:spLocks noGrp="1"/>
+          </p:cNvSpPr>
+          <p:nvPr>
+            <p:ph type="title"/>
+          </p:nvPr>
+        </p:nvSpPr>
+        <p:spPr>
+          <a:xfrm>
+            <a:off x="1261872" y="-2540"/>
+            <a:ext cx="9692640" cy="1325562"/>
+          </a:xfrm>
+        </p:spPr>
+        <p:txBody>
+          <a:bodyPr/>
+          <a:lstStyle/>
+          <a:p>
+            <a:r>
+              <a:rPr lang="en-US" dirty="0"/>
+              <a:t>Reset Password </a:t>
+            </a:r>
+            <a:r>
+              <a:rPr lang="en-US" dirty="0" smtClean="0"/>
+              <a:t>Page</a:t>
+            </a:r>
+            <a:endParaRPr lang="en-US" dirty="0"/>
+          </a:p>
+        </p:txBody>
+      </p:sp>
+      <p:pic>
+        <p:nvPicPr>
+          <p:cNvPr id="4" name="Content Placeholder 3"/>
+          <p:cNvPicPr>
+            <a:picLocks noGrp="1" noChangeAspect="1"/>
+          </p:cNvPicPr>
+          <p:nvPr>
+            <p:ph idx="1"/>
+          </p:nvPr>
+        </p:nvPicPr>
+        <p:blipFill rotWithShape="1">
+          <a:blip r:embed="rId2"/>
+          <a:srcRect l="3141" t="4086" r="2039" b="8063"/>
+          <a:stretch/>
+        </p:blipFill>
+        <p:spPr>
+          <a:xfrm>
+            <a:off x="3568700" y="1348422"/>
+            <a:ext cx="5334000" cy="5334000"/>
+          </a:xfrm>
+          <a:prstGeom prst="rect">
+            <a:avLst/>
+          </a:prstGeom>
+        </p:spPr>
+      </p:pic>
+    </p:spTree>
+    <p:extLst>
+      <p:ext uri="{BB962C8B-B14F-4D97-AF65-F5344CB8AC3E}">
+        <p14:creationId xmlns:p14="http://schemas.microsoft.com/office/powerpoint/2010/main" val="2445709922"/>
+      </p:ext>
+    </p:extLst>
+  </p:cSld>
+  <p:clrMapOvr>
+    <a:masterClrMapping/>
+  </p:clrMapOvr>
+</p:sld>
+</file>
+
+<file path=ppt/slides/slide11.xml><?xml version="1.0" encoding="utf-8"?>
+<p:sld xmlns:a="http://schemas.openxmlformats.org/drawingml/2006/main" xmlns:r="http://schemas.openxmlformats.org/officeDocument/2006/relationships" xmlns:p="http://schemas.openxmlformats.org/presentationml/2006/main">
+  <p:cSld>
+    <p:spTree>
+      <p:nvGrpSpPr>
+        <p:cNvPr id="1" name=""/>
+        <p:cNvGrpSpPr/>
+        <p:nvPr/>
+      </p:nvGrpSpPr>
+      <p:grpSpPr>
+        <a:xfrm>
+          <a:off x="0" y="0"/>
+          <a:ext cx="0" cy="0"/>
+          <a:chOff x="0" y="0"/>
+          <a:chExt cx="0" cy="0"/>
+        </a:xfrm>
+      </p:grpSpPr>
       <p:pic>
         <p:nvPicPr>
           <p:cNvPr id="4" name="Content Placeholder 3"/>
@@ -3618,10 +3708,17 @@
   <p:clrMapOvr>
     <a:masterClrMapping/>
   </p:clrMapOvr>
+  <p:timing>
+    <p:tnLst>
+      <p:par>
+        <p:cTn id="1" dur="indefinite" restart="never" nodeType="tmRoot"/>
+      </p:par>
+    </p:tnLst>
+  </p:timing>
 </p:sld>
 </file>
 
-<file path=ppt/slides/slide11.xml><?xml version="1.0" encoding="utf-8"?>
+<file path=ppt/slides/slide12.xml><?xml version="1.0" encoding="utf-8"?>
 <p:sld xmlns:a="http://schemas.openxmlformats.org/drawingml/2006/main" xmlns:r="http://schemas.openxmlformats.org/officeDocument/2006/relationships" xmlns:p="http://schemas.openxmlformats.org/presentationml/2006/main">
   <p:cSld>
     <p:spTree>
@@ -3715,7 +3812,7 @@
 </p:sld>
 </file>
 
-<file path=ppt/slides/slide12.xml><?xml version="1.0" encoding="utf-8"?>
+<file path=ppt/slides/slide13.xml><?xml version="1.0" encoding="utf-8"?>
 <p:sld xmlns:a="http://schemas.openxmlformats.org/drawingml/2006/main" xmlns:r="http://schemas.openxmlformats.org/officeDocument/2006/relationships" xmlns:p="http://schemas.openxmlformats.org/presentationml/2006/main">
   <p:cSld>
     <p:spTree>
@@ -3744,7 +3841,7 @@
         </p:nvSpPr>
         <p:spPr>
           <a:xfrm>
-            <a:off x="917315" y="0"/>
+            <a:off x="917315" y="-92764"/>
             <a:ext cx="9692640" cy="1325562"/>
           </a:xfrm>
         </p:spPr>
@@ -3762,7 +3859,7 @@
       </p:sp>
       <p:pic>
         <p:nvPicPr>
-          <p:cNvPr id="4" name="Content Placeholder 3"/>
+          <p:cNvPr id="5" name="Content Placeholder 4"/>
           <p:cNvPicPr>
             <a:picLocks noGrp="1" noChangeAspect="1"/>
           </p:cNvPicPr>
@@ -3778,8 +3875,8 @@
         </p:blipFill>
         <p:spPr>
           <a:xfrm>
-            <a:off x="4527029" y="106017"/>
-            <a:ext cx="4868761" cy="6612678"/>
+            <a:off x="4358626" y="42343"/>
+            <a:ext cx="5090174" cy="6815657"/>
           </a:xfrm>
           <a:prstGeom prst="rect">
             <a:avLst/>
@@ -3796,6 +3893,177 @@
   <p:clrMapOvr>
     <a:masterClrMapping/>
   </p:clrMapOvr>
+  <p:timing>
+    <p:tnLst>
+      <p:par>
+        <p:cTn id="1" dur="indefinite" restart="never" nodeType="tmRoot"/>
+      </p:par>
+    </p:tnLst>
+  </p:timing>
+</p:sld>
+</file>
+
+<file path=ppt/slides/slide14.xml><?xml version="1.0" encoding="utf-8"?>
+<p:sld xmlns:a="http://schemas.openxmlformats.org/drawingml/2006/main" xmlns:r="http://schemas.openxmlformats.org/officeDocument/2006/relationships" xmlns:p="http://schemas.openxmlformats.org/presentationml/2006/main">
+  <p:cSld>
+    <p:spTree>
+      <p:nvGrpSpPr>
+        <p:cNvPr id="1" name=""/>
+        <p:cNvGrpSpPr/>
+        <p:nvPr/>
+      </p:nvGrpSpPr>
+      <p:grpSpPr>
+        <a:xfrm>
+          <a:off x="0" y="0"/>
+          <a:ext cx="0" cy="0"/>
+          <a:chOff x="0" y="0"/>
+          <a:chExt cx="0" cy="0"/>
+        </a:xfrm>
+      </p:grpSpPr>
+      <p:pic>
+        <p:nvPicPr>
+          <p:cNvPr id="4" name="Content Placeholder 3"/>
+          <p:cNvPicPr>
+            <a:picLocks noGrp="1" noChangeAspect="1"/>
+          </p:cNvPicPr>
+          <p:nvPr>
+            <p:ph idx="1"/>
+          </p:nvPr>
+        </p:nvPicPr>
+        <p:blipFill>
+          <a:blip r:embed="rId2"/>
+          <a:stretch>
+            <a:fillRect/>
+          </a:stretch>
+        </p:blipFill>
+        <p:spPr>
+          <a:xfrm>
+            <a:off x="3097739" y="-13252"/>
+            <a:ext cx="4615026" cy="6903149"/>
+          </a:xfrm>
+          <a:prstGeom prst="rect">
+            <a:avLst/>
+          </a:prstGeom>
+        </p:spPr>
+      </p:pic>
+    </p:spTree>
+    <p:extLst>
+      <p:ext uri="{BB962C8B-B14F-4D97-AF65-F5344CB8AC3E}">
+        <p14:creationId xmlns:p14="http://schemas.microsoft.com/office/powerpoint/2010/main" val="926326031"/>
+      </p:ext>
+    </p:extLst>
+  </p:cSld>
+  <p:clrMapOvr>
+    <a:masterClrMapping/>
+  </p:clrMapOvr>
+  <p:timing>
+    <p:tnLst>
+      <p:par>
+        <p:cTn id="1" dur="indefinite" restart="never" nodeType="tmRoot"/>
+      </p:par>
+    </p:tnLst>
+  </p:timing>
+</p:sld>
+</file>
+
+<file path=ppt/slides/slide15.xml><?xml version="1.0" encoding="utf-8"?>
+<p:sld xmlns:a="http://schemas.openxmlformats.org/drawingml/2006/main" xmlns:r="http://schemas.openxmlformats.org/officeDocument/2006/relationships" xmlns:p="http://schemas.openxmlformats.org/presentationml/2006/main">
+  <p:cSld>
+    <p:spTree>
+      <p:nvGrpSpPr>
+        <p:cNvPr id="1" name=""/>
+        <p:cNvGrpSpPr/>
+        <p:nvPr/>
+      </p:nvGrpSpPr>
+      <p:grpSpPr>
+        <a:xfrm>
+          <a:off x="0" y="0"/>
+          <a:ext cx="0" cy="0"/>
+          <a:chOff x="0" y="0"/>
+          <a:chExt cx="0" cy="0"/>
+        </a:xfrm>
+      </p:grpSpPr>
+      <p:sp>
+        <p:nvSpPr>
+          <p:cNvPr id="2" name="Title 1"/>
+          <p:cNvSpPr>
+            <a:spLocks noGrp="1"/>
+          </p:cNvSpPr>
+          <p:nvPr>
+            <p:ph type="title"/>
+          </p:nvPr>
+        </p:nvSpPr>
+        <p:spPr>
+          <a:xfrm>
+            <a:off x="1261872" y="-5302"/>
+            <a:ext cx="9692640" cy="1325562"/>
+          </a:xfrm>
+        </p:spPr>
+        <p:txBody>
+          <a:bodyPr/>
+          <a:lstStyle/>
+          <a:p>
+            <a:r>
+              <a:rPr lang="en-US" dirty="0"/>
+              <a:t>Product </a:t>
+            </a:r>
+            <a:r>
+              <a:rPr lang="en-US" dirty="0" smtClean="0"/>
+              <a:t>List </a:t>
+            </a:r>
+            <a:r>
+              <a:rPr lang="en-US" dirty="0"/>
+              <a:t>Design</a:t>
+            </a:r>
+          </a:p>
+        </p:txBody>
+      </p:sp>
+      <p:pic>
+        <p:nvPicPr>
+          <p:cNvPr id="4" name="Content Placeholder 3"/>
+          <p:cNvPicPr>
+            <a:picLocks noGrp="1" noChangeAspect="1"/>
+          </p:cNvPicPr>
+          <p:nvPr>
+            <p:ph idx="1"/>
+          </p:nvPr>
+        </p:nvPicPr>
+        <p:blipFill>
+          <a:blip r:embed="rId2">
+            <a:extLst>
+              <a:ext uri="{28A0092B-C50C-407E-A947-70E740481C1C}">
+                <a14:useLocalDpi xmlns:a14="http://schemas.microsoft.com/office/drawing/2010/main" val="0"/>
+              </a:ext>
+            </a:extLst>
+          </a:blip>
+          <a:stretch>
+            <a:fillRect/>
+          </a:stretch>
+        </p:blipFill>
+        <p:spPr>
+          <a:xfrm>
+            <a:off x="2412313" y="1470990"/>
+            <a:ext cx="7074900" cy="5128593"/>
+          </a:xfrm>
+        </p:spPr>
+      </p:pic>
+    </p:spTree>
+    <p:extLst>
+      <p:ext uri="{BB962C8B-B14F-4D97-AF65-F5344CB8AC3E}">
+        <p14:creationId xmlns:p14="http://schemas.microsoft.com/office/powerpoint/2010/main" val="2675029829"/>
+      </p:ext>
+    </p:extLst>
+  </p:cSld>
+  <p:clrMapOvr>
+    <a:masterClrMapping/>
+  </p:clrMapOvr>
+  <p:timing>
+    <p:tnLst>
+      <p:par>
+        <p:cTn id="1" dur="indefinite" restart="never" nodeType="tmRoot"/>
+      </p:par>
+    </p:tnLst>
+  </p:timing>
 </p:sld>
 </file>
 
@@ -3828,7 +4096,7 @@
         </p:nvSpPr>
         <p:spPr>
           <a:xfrm>
-            <a:off x="1261872" y="0"/>
+            <a:off x="1261872" y="-212032"/>
             <a:ext cx="9692640" cy="1325562"/>
           </a:xfrm>
         </p:spPr>
@@ -3856,73 +4124,184 @@
         </p:nvSpPr>
         <p:spPr>
           <a:xfrm>
-            <a:off x="1261872" y="1325562"/>
-            <a:ext cx="8595360" cy="4854575"/>
+            <a:off x="1261872" y="1166538"/>
+            <a:ext cx="8595360" cy="5539062"/>
           </a:xfrm>
         </p:spPr>
         <p:txBody>
-          <a:bodyPr/>
-          <a:lstStyle/>
-          <a:p>
-            <a:r>
-              <a:rPr lang="en-US" dirty="0" smtClean="0"/>
+          <a:bodyPr>
+            <a:normAutofit/>
+          </a:bodyPr>
+          <a:lstStyle/>
+          <a:p>
+            <a:r>
+              <a:rPr lang="en-US" dirty="0" smtClean="0">
+                <a:solidFill>
+                  <a:srgbClr val="002060"/>
+                </a:solidFill>
+                <a:hlinkClick r:id="rId2" action="ppaction://hlinksldjump"/>
+              </a:rPr>
               <a:t>ER Diagram</a:t>
             </a:r>
-          </a:p>
-          <a:p>
-            <a:r>
-              <a:rPr lang="en-US" dirty="0" smtClean="0"/>
+            <a:endParaRPr lang="en-US" dirty="0" smtClean="0">
+              <a:solidFill>
+                <a:srgbClr val="002060"/>
+              </a:solidFill>
+            </a:endParaRPr>
+          </a:p>
+          <a:p>
+            <a:r>
+              <a:rPr lang="en-US" dirty="0" smtClean="0">
+                <a:solidFill>
+                  <a:srgbClr val="002060"/>
+                </a:solidFill>
+                <a:hlinkClick r:id="rId3" action="ppaction://hlinksldjump"/>
+              </a:rPr>
               <a:t>Use Case Diagram</a:t>
             </a:r>
-          </a:p>
-          <a:p>
-            <a:r>
-              <a:rPr lang="en-US" dirty="0" smtClean="0"/>
+            <a:endParaRPr lang="en-US" dirty="0" smtClean="0">
+              <a:solidFill>
+                <a:srgbClr val="002060"/>
+              </a:solidFill>
+            </a:endParaRPr>
+          </a:p>
+          <a:p>
+            <a:r>
+              <a:rPr lang="en-US" dirty="0" smtClean="0">
+                <a:solidFill>
+                  <a:srgbClr val="002060"/>
+                </a:solidFill>
+                <a:hlinkClick r:id="rId4" action="ppaction://hlinksldjump"/>
+              </a:rPr>
               <a:t>Class Diagram</a:t>
             </a:r>
-          </a:p>
-          <a:p>
-            <a:r>
-              <a:rPr lang="en-US" dirty="0" smtClean="0"/>
+            <a:endParaRPr lang="en-US" dirty="0" smtClean="0">
+              <a:solidFill>
+                <a:srgbClr val="002060"/>
+              </a:solidFill>
+            </a:endParaRPr>
+          </a:p>
+          <a:p>
+            <a:r>
+              <a:rPr lang="en-US" dirty="0" smtClean="0">
+                <a:solidFill>
+                  <a:srgbClr val="002060"/>
+                </a:solidFill>
+              </a:rPr>
               <a:t>Login Page Design</a:t>
             </a:r>
           </a:p>
           <a:p>
             <a:pPr lvl="1"/>
             <a:r>
-              <a:rPr lang="en-US" dirty="0" smtClean="0"/>
-              <a:t>Login page</a:t>
-            </a:r>
+              <a:rPr lang="en-US" dirty="0" smtClean="0">
+                <a:solidFill>
+                  <a:srgbClr val="002060"/>
+                </a:solidFill>
+                <a:hlinkClick r:id="rId5" action="ppaction://hlinksldjump"/>
+              </a:rPr>
+              <a:t>Login </a:t>
+            </a:r>
+            <a:r>
+              <a:rPr lang="en-US" dirty="0" smtClean="0">
+                <a:solidFill>
+                  <a:srgbClr val="002060"/>
+                </a:solidFill>
+                <a:hlinkClick r:id="rId5" action="ppaction://hlinksldjump"/>
+              </a:rPr>
+              <a:t>page</a:t>
+            </a:r>
+            <a:endParaRPr lang="en-US" dirty="0" smtClean="0">
+              <a:solidFill>
+                <a:srgbClr val="002060"/>
+              </a:solidFill>
+            </a:endParaRPr>
           </a:p>
           <a:p>
             <a:pPr lvl="1"/>
             <a:r>
-              <a:rPr lang="en-US" dirty="0" smtClean="0"/>
+              <a:rPr lang="en-US" dirty="0" smtClean="0">
+                <a:solidFill>
+                  <a:srgbClr val="002060"/>
+                </a:solidFill>
+                <a:hlinkClick r:id="rId6" action="ppaction://hlinksldjump"/>
+              </a:rPr>
+              <a:t>Login page design</a:t>
+            </a:r>
+            <a:endParaRPr lang="en-US" dirty="0" smtClean="0">
+              <a:solidFill>
+                <a:srgbClr val="002060"/>
+              </a:solidFill>
+            </a:endParaRPr>
+          </a:p>
+          <a:p>
+            <a:pPr lvl="1"/>
+            <a:r>
+              <a:rPr lang="en-US" dirty="0" smtClean="0">
+                <a:solidFill>
+                  <a:srgbClr val="002060"/>
+                </a:solidFill>
+                <a:hlinkClick r:id="rId7" action="ppaction://hlinksldjump"/>
+              </a:rPr>
               <a:t>Forgot password page</a:t>
             </a:r>
+            <a:endParaRPr lang="en-US" dirty="0" smtClean="0">
+              <a:solidFill>
+                <a:srgbClr val="002060"/>
+              </a:solidFill>
+            </a:endParaRPr>
           </a:p>
           <a:p>
             <a:pPr lvl="1"/>
             <a:r>
-              <a:rPr lang="en-US" dirty="0"/>
-              <a:t>Forgot Password verification </a:t>
-            </a:r>
-            <a:r>
-              <a:rPr lang="en-US" dirty="0" smtClean="0"/>
-              <a:t>code page</a:t>
-            </a:r>
+              <a:rPr lang="en-US" dirty="0" smtClean="0">
+                <a:solidFill>
+                  <a:srgbClr val="002060"/>
+                </a:solidFill>
+                <a:hlinkClick r:id="rId8" action="ppaction://hlinksldjump"/>
+              </a:rPr>
+              <a:t>Forgot Password verification code page</a:t>
+            </a:r>
+            <a:endParaRPr lang="en-US" dirty="0" smtClean="0">
+              <a:solidFill>
+                <a:srgbClr val="002060"/>
+              </a:solidFill>
+            </a:endParaRPr>
           </a:p>
           <a:p>
             <a:pPr lvl="1"/>
             <a:r>
-              <a:rPr lang="en-US" dirty="0"/>
-              <a:t>Reset Password </a:t>
-            </a:r>
-            <a:r>
-              <a:rPr lang="en-US" dirty="0" smtClean="0"/>
+              <a:rPr lang="en-US" dirty="0" smtClean="0">
+                <a:solidFill>
+                  <a:srgbClr val="002060"/>
+                </a:solidFill>
+                <a:hlinkClick r:id="rId9" action="ppaction://hlinksldjump"/>
+              </a:rPr>
+              <a:t>Reset </a:t>
+            </a:r>
+            <a:r>
+              <a:rPr lang="en-US" dirty="0">
+                <a:solidFill>
+                  <a:srgbClr val="002060"/>
+                </a:solidFill>
+                <a:hlinkClick r:id="rId9" action="ppaction://hlinksldjump"/>
+              </a:rPr>
+              <a:t>Password </a:t>
+            </a:r>
+            <a:r>
+              <a:rPr lang="en-US" dirty="0" smtClean="0">
+                <a:solidFill>
+                  <a:srgbClr val="002060"/>
+                </a:solidFill>
+                <a:hlinkClick r:id="rId9" action="ppaction://hlinksldjump"/>
+              </a:rPr>
               <a:t>page</a:t>
             </a:r>
-            <a:endParaRPr lang="en-US" dirty="0"/>
+            <a:endParaRPr lang="en-US" dirty="0">
+              <a:solidFill>
+                <a:srgbClr val="002060"/>
+              </a:solidFill>
+            </a:endParaRPr>
           </a:p>
           <a:p>
             <a:pPr marL="182880" lvl="1">
@@ -3942,7 +4321,7 @@
             <a:r>
               <a:rPr lang="en-US" sz="1800" spc="10" dirty="0" smtClean="0">
                 <a:solidFill>
-                  <a:schemeClr val="tx1"/>
+                  <a:srgbClr val="002060"/>
                 </a:solidFill>
               </a:rPr>
               <a:t>Member Registration Design</a:t>
@@ -3953,23 +4332,38 @@
               <a:buSzPct val="80000"/>
             </a:pPr>
             <a:r>
-              <a:rPr lang="en-US" dirty="0" smtClean="0"/>
+              <a:rPr lang="en-US" dirty="0" smtClean="0">
+                <a:solidFill>
+                  <a:srgbClr val="002060"/>
+                </a:solidFill>
+                <a:hlinkClick r:id="rId10" action="ppaction://hlinksldjump"/>
+              </a:rPr>
               <a:t>Customer Registration</a:t>
             </a:r>
+            <a:endParaRPr lang="en-US" dirty="0" smtClean="0">
+              <a:solidFill>
+                <a:srgbClr val="002060"/>
+              </a:solidFill>
+            </a:endParaRPr>
           </a:p>
           <a:p>
             <a:pPr lvl="1">
               <a:buSzPct val="80000"/>
             </a:pPr>
             <a:r>
-              <a:rPr lang="en-US" dirty="0" smtClean="0"/>
-              <a:t>Staff </a:t>
-            </a:r>
-            <a:r>
-              <a:rPr lang="en-US" dirty="0" smtClean="0"/>
-              <a:t>Registration</a:t>
-            </a:r>
-            <a:endParaRPr lang="en-US" dirty="0"/>
+              <a:rPr lang="en-US" dirty="0" smtClean="0">
+                <a:solidFill>
+                  <a:srgbClr val="002060"/>
+                </a:solidFill>
+                <a:hlinkClick r:id="rId11" action="ppaction://hlinksldjump"/>
+              </a:rPr>
+              <a:t>Staff Registration</a:t>
+            </a:r>
+            <a:endParaRPr lang="en-US" dirty="0">
+              <a:solidFill>
+                <a:srgbClr val="002060"/>
+              </a:solidFill>
+            </a:endParaRPr>
           </a:p>
           <a:p>
             <a:pPr marL="182880" lvl="1">
@@ -3989,11 +4383,114 @@
             <a:r>
               <a:rPr lang="en-US" sz="1800" spc="10" dirty="0">
                 <a:solidFill>
-                  <a:schemeClr val="tx1"/>
+                  <a:srgbClr val="002060"/>
                 </a:solidFill>
               </a:rPr>
-              <a:t>Product List</a:t>
-            </a:r>
+              <a:t>Product </a:t>
+            </a:r>
+            <a:r>
+              <a:rPr lang="en-US" sz="1800" spc="10" dirty="0" smtClean="0">
+                <a:solidFill>
+                  <a:srgbClr val="002060"/>
+                </a:solidFill>
+              </a:rPr>
+              <a:t>List Design</a:t>
+            </a:r>
+          </a:p>
+          <a:p>
+            <a:pPr lvl="1">
+              <a:lnSpc>
+                <a:spcPct val="100000"/>
+              </a:lnSpc>
+              <a:buSzPct val="80000"/>
+            </a:pPr>
+            <a:r>
+              <a:rPr lang="en-US" dirty="0">
+                <a:solidFill>
+                  <a:srgbClr val="002060"/>
+                </a:solidFill>
+                <a:hlinkClick r:id="rId12" action="ppaction://hlinksldjump"/>
+              </a:rPr>
+              <a:t>Product list</a:t>
+            </a:r>
+            <a:endParaRPr lang="en-US" dirty="0">
+              <a:solidFill>
+                <a:srgbClr val="002060"/>
+              </a:solidFill>
+            </a:endParaRPr>
+          </a:p>
+          <a:p>
+            <a:pPr lvl="1">
+              <a:lnSpc>
+                <a:spcPct val="100000"/>
+              </a:lnSpc>
+              <a:buSzPct val="80000"/>
+            </a:pPr>
+            <a:r>
+              <a:rPr lang="en-US" dirty="0">
+                <a:solidFill>
+                  <a:srgbClr val="002060"/>
+                </a:solidFill>
+                <a:hlinkClick r:id="rId13" action="ppaction://hlinksldjump"/>
+              </a:rPr>
+              <a:t>Product </a:t>
+            </a:r>
+            <a:r>
+              <a:rPr lang="en-US" dirty="0">
+                <a:solidFill>
+                  <a:srgbClr val="002060"/>
+                </a:solidFill>
+                <a:hlinkClick r:id="rId13" action="ppaction://hlinksldjump"/>
+              </a:rPr>
+              <a:t>list Design</a:t>
+            </a:r>
+            <a:endParaRPr lang="en-US" dirty="0">
+              <a:solidFill>
+                <a:srgbClr val="002060"/>
+              </a:solidFill>
+            </a:endParaRPr>
+          </a:p>
+          <a:p>
+            <a:pPr marL="457200" lvl="2">
+              <a:lnSpc>
+                <a:spcPct val="95000"/>
+              </a:lnSpc>
+              <a:spcBef>
+                <a:spcPts val="1400"/>
+              </a:spcBef>
+              <a:spcAft>
+                <a:spcPts val="200"/>
+              </a:spcAft>
+              <a:buSzPct val="80000"/>
+              <a:buFont typeface="Arial" pitchFamily="34" charset="0"/>
+              <a:buChar char="•"/>
+            </a:pPr>
+            <a:endParaRPr lang="en-US" spc="10" dirty="0" smtClean="0">
+              <a:solidFill>
+                <a:schemeClr val="tx1"/>
+              </a:solidFill>
+            </a:endParaRPr>
+          </a:p>
+          <a:p>
+            <a:pPr marL="182880" lvl="1">
+              <a:lnSpc>
+                <a:spcPct val="95000"/>
+              </a:lnSpc>
+              <a:spcBef>
+                <a:spcPts val="1400"/>
+              </a:spcBef>
+              <a:spcAft>
+                <a:spcPts val="200"/>
+              </a:spcAft>
+              <a:buSzPct val="80000"/>
+              <a:buFont typeface="Arial" pitchFamily="34" charset="0"/>
+              <a:buChar char="•"/>
+            </a:pPr>
+            <a:endParaRPr lang="en-US" sz="1800" spc="10" dirty="0">
+              <a:solidFill>
+                <a:schemeClr val="tx1"/>
+              </a:solidFill>
+            </a:endParaRPr>
           </a:p>
         </p:txBody>
       </p:sp>
@@ -4007,6 +4504,13 @@
   <p:clrMapOvr>
     <a:masterClrMapping/>
   </p:clrMapOvr>
+  <p:timing>
+    <p:tnLst>
+      <p:par>
+        <p:cTn id="1" dur="indefinite" restart="never" nodeType="tmRoot"/>
+      </p:par>
+    </p:tnLst>
+  </p:timing>
 </p:sld>
 </file>
 
@@ -4371,6 +4875,29 @@
           <a:chExt cx="0" cy="0"/>
         </a:xfrm>
       </p:grpSpPr>
+      <p:sp>
+        <p:nvSpPr>
+          <p:cNvPr id="2" name="Title 1"/>
+          <p:cNvSpPr>
+            <a:spLocks noGrp="1"/>
+          </p:cNvSpPr>
+          <p:nvPr>
+            <p:ph type="title"/>
+          </p:nvPr>
+        </p:nvSpPr>
+        <p:spPr/>
+        <p:txBody>
+          <a:bodyPr/>
+          <a:lstStyle/>
+          <a:p>
+            <a:r>
+              <a:rPr lang="en-US" dirty="0" smtClean="0"/>
+              <a:t>Login Design</a:t>
+            </a:r>
+            <a:endParaRPr lang="en-US" dirty="0"/>
+          </a:p>
+        </p:txBody>
+      </p:sp>
       <p:pic>
         <p:nvPicPr>
           <p:cNvPr id="4" name="Content Placeholder 3"/>
@@ -4381,59 +4908,42 @@
             <p:ph idx="1"/>
           </p:nvPr>
         </p:nvPicPr>
-        <p:blipFill rotWithShape="1">
-          <a:blip r:embed="rId2"/>
-          <a:srcRect t="3646" r="1149" b="1331"/>
-          <a:stretch/>
+        <p:blipFill>
+          <a:blip r:embed="rId2">
+            <a:extLst>
+              <a:ext uri="{28A0092B-C50C-407E-A947-70E740481C1C}">
+                <a14:useLocalDpi xmlns:a14="http://schemas.microsoft.com/office/drawing/2010/main" val="0"/>
+              </a:ext>
+            </a:extLst>
+          </a:blip>
+          <a:stretch>
+            <a:fillRect/>
+          </a:stretch>
         </p:blipFill>
         <p:spPr>
           <a:xfrm>
-            <a:off x="3718156" y="1048100"/>
-            <a:ext cx="5070244" cy="5759100"/>
+            <a:off x="1506538" y="2089944"/>
+            <a:ext cx="8105775" cy="3829050"/>
           </a:xfrm>
-          <a:prstGeom prst="rect">
-            <a:avLst/>
-          </a:prstGeom>
         </p:spPr>
       </p:pic>
-      <p:sp>
-        <p:nvSpPr>
-          <p:cNvPr id="2" name="Title 1"/>
-          <p:cNvSpPr>
-            <a:spLocks noGrp="1"/>
-          </p:cNvSpPr>
-          <p:nvPr>
-            <p:ph type="title"/>
-          </p:nvPr>
-        </p:nvSpPr>
-        <p:spPr>
-          <a:xfrm>
-            <a:off x="830072" y="-139700"/>
-            <a:ext cx="9692640" cy="1325562"/>
-          </a:xfrm>
-        </p:spPr>
-        <p:txBody>
-          <a:bodyPr/>
-          <a:lstStyle/>
-          <a:p>
-            <a:r>
-              <a:rPr lang="en-US" dirty="0" smtClean="0"/>
-              <a:t>Forgot Password Page</a:t>
-            </a:r>
-            <a:endParaRPr lang="en-US" dirty="0"/>
-          </a:p>
-        </p:txBody>
-      </p:sp>
     </p:spTree>
     <p:extLst>
       <p:ext uri="{BB962C8B-B14F-4D97-AF65-F5344CB8AC3E}">
-        <p14:creationId xmlns:p14="http://schemas.microsoft.com/office/powerpoint/2010/main" val="2093361532"/>
+        <p14:creationId xmlns:p14="http://schemas.microsoft.com/office/powerpoint/2010/main" val="2458059238"/>
       </p:ext>
     </p:extLst>
   </p:cSld>
   <p:clrMapOvr>
     <a:masterClrMapping/>
   </p:clrMapOvr>
+  <p:timing>
+    <p:tnLst>
+      <p:par>
+        <p:cTn id="1" dur="indefinite" restart="never" nodeType="tmRoot"/>
+      </p:par>
+    </p:tnLst>
+  </p:timing>
 </p:sld>
 </file>
 
@@ -4454,39 +4964,9 @@
           <a:chExt cx="0" cy="0"/>
         </a:xfrm>
       </p:grpSpPr>
-      <p:sp>
-        <p:nvSpPr>
-          <p:cNvPr id="2" name="Title 1"/>
-          <p:cNvSpPr>
-            <a:spLocks noGrp="1"/>
-          </p:cNvSpPr>
-          <p:nvPr>
-            <p:ph type="title"/>
-          </p:nvPr>
-        </p:nvSpPr>
-        <p:spPr>
-          <a:xfrm>
-            <a:off x="1193800" y="-76200"/>
-            <a:ext cx="10078212" cy="1325562"/>
-          </a:xfrm>
-        </p:spPr>
-        <p:txBody>
-          <a:bodyPr>
-            <a:normAutofit/>
-          </a:bodyPr>
-          <a:lstStyle/>
-          <a:p>
-            <a:r>
-              <a:rPr lang="en-US" sz="4200" dirty="0" smtClean="0"/>
-              <a:t>Forgot Password Verification Code Page</a:t>
-            </a:r>
-            <a:endParaRPr lang="en-US" sz="4200" dirty="0"/>
-          </a:p>
-        </p:txBody>
-      </p:sp>
       <p:pic>
         <p:nvPicPr>
-          <p:cNvPr id="6" name="Content Placeholder 5"/>
+          <p:cNvPr id="4" name="Content Placeholder 3"/>
           <p:cNvPicPr>
             <a:picLocks noGrp="1" noChangeAspect="1"/>
           </p:cNvPicPr>
@@ -4496,23 +4976,51 @@
         </p:nvPicPr>
         <p:blipFill rotWithShape="1">
           <a:blip r:embed="rId2"/>
-          <a:srcRect l="2260" t="4145" r="2321" b="8483"/>
+          <a:srcRect t="3646" r="1149" b="1331"/>
           <a:stretch/>
         </p:blipFill>
         <p:spPr>
           <a:xfrm>
-            <a:off x="3403600" y="1223962"/>
-            <a:ext cx="5524500" cy="5537942"/>
+            <a:off x="3718156" y="1048100"/>
+            <a:ext cx="5070244" cy="5759100"/>
           </a:xfrm>
           <a:prstGeom prst="rect">
             <a:avLst/>
           </a:prstGeom>
         </p:spPr>
       </p:pic>
+      <p:sp>
+        <p:nvSpPr>
+          <p:cNvPr id="2" name="Title 1"/>
+          <p:cNvSpPr>
+            <a:spLocks noGrp="1"/>
+          </p:cNvSpPr>
+          <p:nvPr>
+            <p:ph type="title"/>
+          </p:nvPr>
+        </p:nvSpPr>
+        <p:spPr>
+          <a:xfrm>
+            <a:off x="830072" y="-139700"/>
+            <a:ext cx="9692640" cy="1325562"/>
+          </a:xfrm>
+        </p:spPr>
+        <p:txBody>
+          <a:bodyPr/>
+          <a:lstStyle/>
+          <a:p>
+            <a:r>
+              <a:rPr lang="en-US" dirty="0" smtClean="0"/>
+              <a:t>Forgot Password Page</a:t>
+            </a:r>
+            <a:endParaRPr lang="en-US" dirty="0"/>
+          </a:p>
+        </p:txBody>
+      </p:sp>
     </p:spTree>
     <p:extLst>
       <p:ext uri="{BB962C8B-B14F-4D97-AF65-F5344CB8AC3E}">
-        <p14:creationId xmlns:p14="http://schemas.microsoft.com/office/powerpoint/2010/main" val="3704594105"/>
+        <p14:creationId xmlns:p14="http://schemas.microsoft.com/office/powerpoint/2010/main" val="2093361532"/>
       </p:ext>
     </p:extLst>
   </p:cSld>
@@ -4551,29 +5059,27 @@
         </p:nvSpPr>
         <p:spPr>
           <a:xfrm>
-            <a:off x="1261872" y="-2540"/>
-            <a:ext cx="9692640" cy="1325562"/>
+            <a:off x="1193800" y="-76200"/>
+            <a:ext cx="10078212" cy="1325562"/>
           </a:xfrm>
         </p:spPr>
         <p:txBody>
-          <a:bodyPr/>
-          <a:lstStyle/>
-          <a:p>
-            <a:r>
-              <a:rPr lang="en-US" dirty="0"/>
-              <a:t>Reset Password </a:t>
-            </a:r>
-            <a:r>
-              <a:rPr lang="en-US" dirty="0" smtClean="0"/>
-              <a:t>Page</a:t>
-            </a:r>
-            <a:endParaRPr lang="en-US" dirty="0"/>
+          <a:bodyPr>
+            <a:normAutofit/>
+          </a:bodyPr>
+          <a:lstStyle/>
+          <a:p>
+            <a:r>
+              <a:rPr lang="en-US" sz="4200" dirty="0" smtClean="0"/>
+              <a:t>Forgot Password Verification Code Page</a:t>
+            </a:r>
+            <a:endParaRPr lang="en-US" sz="4200" dirty="0"/>
           </a:p>
         </p:txBody>
       </p:sp>
       <p:pic>
         <p:nvPicPr>
-          <p:cNvPr id="4" name="Content Placeholder 3"/>
+          <p:cNvPr id="6" name="Content Placeholder 5"/>
           <p:cNvPicPr>
             <a:picLocks noGrp="1" noChangeAspect="1"/>
           </p:cNvPicPr>
@@ -4583,13 +5089,13 @@
         </p:nvPicPr>
         <p:blipFill rotWithShape="1">
           <a:blip r:embed="rId2"/>
-          <a:srcRect l="3141" t="4086" r="2039" b="8063"/>
+          <a:srcRect l="2260" t="4145" r="2321" b="8483"/>
           <a:stretch/>
         </p:blipFill>
         <p:spPr>
           <a:xfrm>
-            <a:off x="3568700" y="1348422"/>
-            <a:ext cx="5334000" cy="5334000"/>
+            <a:off x="3403600" y="1223962"/>
+            <a:ext cx="5524500" cy="5537942"/>
           </a:xfrm>
           <a:prstGeom prst="rect">
             <a:avLst/>
@@ -4599,7 +5105,7 @@
     </p:spTree>
     <p:extLst>
       <p:ext uri="{BB962C8B-B14F-4D97-AF65-F5344CB8AC3E}">
-        <p14:creationId xmlns:p14="http://schemas.microsoft.com/office/powerpoint/2010/main" val="2445709922"/>
+        <p14:creationId xmlns:p14="http://schemas.microsoft.com/office/powerpoint/2010/main" val="3704594105"/>
       </p:ext>
     </p:extLst>
   </p:cSld>

</xml_diff>

<commit_message>
add the models for project
</commit_message>
<xml_diff>
--- a/Docs/ShoppingCart.pptx
+++ b/Docs/ShoppingCart.pptx
@@ -7,19 +7,21 @@
   <p:sldIdLst>
     <p:sldId id="256" r:id="rId2"/>
     <p:sldId id="257" r:id="rId3"/>
-    <p:sldId id="258" r:id="rId4"/>
-    <p:sldId id="259" r:id="rId5"/>
-    <p:sldId id="260" r:id="rId6"/>
-    <p:sldId id="261" r:id="rId7"/>
-    <p:sldId id="268" r:id="rId8"/>
-    <p:sldId id="262" r:id="rId9"/>
-    <p:sldId id="263" r:id="rId10"/>
-    <p:sldId id="264" r:id="rId11"/>
-    <p:sldId id="265" r:id="rId12"/>
-    <p:sldId id="266" r:id="rId13"/>
+    <p:sldId id="271" r:id="rId4"/>
+    <p:sldId id="258" r:id="rId5"/>
+    <p:sldId id="259" r:id="rId6"/>
+    <p:sldId id="260" r:id="rId7"/>
+    <p:sldId id="261" r:id="rId8"/>
+    <p:sldId id="268" r:id="rId9"/>
+    <p:sldId id="262" r:id="rId10"/>
+    <p:sldId id="263" r:id="rId11"/>
+    <p:sldId id="264" r:id="rId12"/>
+    <p:sldId id="265" r:id="rId13"/>
     <p:sldId id="267" r:id="rId14"/>
     <p:sldId id="269" r:id="rId15"/>
     <p:sldId id="270" r:id="rId16"/>
+    <p:sldId id="273" r:id="rId17"/>
+    <p:sldId id="275" r:id="rId18"/>
   </p:sldIdLst>
   <p:sldSz cx="12192000" cy="6858000"/>
   <p:notesSz cx="6858000" cy="9144000"/>
@@ -294,7 +296,7 @@
           <a:p>
             <a:fld id="{FC0E3BE2-2296-44B4-87B8-79CBB784B606}" type="datetimeFigureOut">
               <a:rPr lang="en-US" smtClean="0"/>
-              <a:t>6/15/2020</a:t>
+              <a:t>6/16/2020</a:t>
             </a:fld>
             <a:endParaRPr lang="en-US"/>
           </a:p>
@@ -522,7 +524,7 @@
           <a:p>
             <a:fld id="{FC0E3BE2-2296-44B4-87B8-79CBB784B606}" type="datetimeFigureOut">
               <a:rPr lang="en-US" smtClean="0"/>
-              <a:t>6/15/2020</a:t>
+              <a:t>6/16/2020</a:t>
             </a:fld>
             <a:endParaRPr lang="en-US"/>
           </a:p>
@@ -702,7 +704,7 @@
           <a:p>
             <a:fld id="{FC0E3BE2-2296-44B4-87B8-79CBB784B606}" type="datetimeFigureOut">
               <a:rPr lang="en-US" smtClean="0"/>
-              <a:t>6/15/2020</a:t>
+              <a:t>6/16/2020</a:t>
             </a:fld>
             <a:endParaRPr lang="en-US"/>
           </a:p>
@@ -872,7 +874,7 @@
           <a:p>
             <a:fld id="{FC0E3BE2-2296-44B4-87B8-79CBB784B606}" type="datetimeFigureOut">
               <a:rPr lang="en-US" smtClean="0"/>
-              <a:t>6/15/2020</a:t>
+              <a:t>6/16/2020</a:t>
             </a:fld>
             <a:endParaRPr lang="en-US"/>
           </a:p>
@@ -1126,7 +1128,7 @@
           <a:p>
             <a:fld id="{FC0E3BE2-2296-44B4-87B8-79CBB784B606}" type="datetimeFigureOut">
               <a:rPr lang="en-US" smtClean="0"/>
-              <a:t>6/15/2020</a:t>
+              <a:t>6/16/2020</a:t>
             </a:fld>
             <a:endParaRPr lang="en-US"/>
           </a:p>
@@ -1452,7 +1454,7 @@
           <a:p>
             <a:fld id="{FC0E3BE2-2296-44B4-87B8-79CBB784B606}" type="datetimeFigureOut">
               <a:rPr lang="en-US" smtClean="0"/>
-              <a:t>6/15/2020</a:t>
+              <a:t>6/16/2020</a:t>
             </a:fld>
             <a:endParaRPr lang="en-US"/>
           </a:p>
@@ -1903,7 +1905,7 @@
           <a:p>
             <a:fld id="{FC0E3BE2-2296-44B4-87B8-79CBB784B606}" type="datetimeFigureOut">
               <a:rPr lang="en-US" smtClean="0"/>
-              <a:t>6/15/2020</a:t>
+              <a:t>6/16/2020</a:t>
             </a:fld>
             <a:endParaRPr lang="en-US"/>
           </a:p>
@@ -2021,7 +2023,7 @@
           <a:p>
             <a:fld id="{FC0E3BE2-2296-44B4-87B8-79CBB784B606}" type="datetimeFigureOut">
               <a:rPr lang="en-US" smtClean="0"/>
-              <a:t>6/15/2020</a:t>
+              <a:t>6/16/2020</a:t>
             </a:fld>
             <a:endParaRPr lang="en-US"/>
           </a:p>
@@ -2116,7 +2118,7 @@
           <a:p>
             <a:fld id="{FC0E3BE2-2296-44B4-87B8-79CBB784B606}" type="datetimeFigureOut">
               <a:rPr lang="en-US" smtClean="0"/>
-              <a:t>6/15/2020</a:t>
+              <a:t>6/16/2020</a:t>
             </a:fld>
             <a:endParaRPr lang="en-US"/>
           </a:p>
@@ -2403,7 +2405,7 @@
           <a:p>
             <a:fld id="{FC0E3BE2-2296-44B4-87B8-79CBB784B606}" type="datetimeFigureOut">
               <a:rPr lang="en-US" smtClean="0"/>
-              <a:t>6/15/2020</a:t>
+              <a:t>6/16/2020</a:t>
             </a:fld>
             <a:endParaRPr lang="en-US"/>
           </a:p>
@@ -2725,7 +2727,7 @@
           <a:p>
             <a:fld id="{FC0E3BE2-2296-44B4-87B8-79CBB784B606}" type="datetimeFigureOut">
               <a:rPr lang="en-US" smtClean="0"/>
-              <a:t>6/15/2020</a:t>
+              <a:t>6/16/2020</a:t>
             </a:fld>
             <a:endParaRPr lang="en-US"/>
           </a:p>
@@ -2979,7 +2981,7 @@
           <a:p>
             <a:fld id="{FC0E3BE2-2296-44B4-87B8-79CBB784B606}" type="datetimeFigureOut">
               <a:rPr lang="en-US" smtClean="0"/>
-              <a:t>6/15/2020</a:t>
+              <a:t>6/16/2020</a:t>
             </a:fld>
             <a:endParaRPr lang="en-US"/>
           </a:p>
@@ -3566,6 +3568,91 @@
         </p:nvSpPr>
         <p:spPr>
           <a:xfrm>
+            <a:off x="1193800" y="-76200"/>
+            <a:ext cx="10078212" cy="1325562"/>
+          </a:xfrm>
+        </p:spPr>
+        <p:txBody>
+          <a:bodyPr>
+            <a:normAutofit/>
+          </a:bodyPr>
+          <a:lstStyle/>
+          <a:p>
+            <a:r>
+              <a:rPr lang="en-US" sz="4200" dirty="0" smtClean="0"/>
+              <a:t>Forgot Password Verification Code Page</a:t>
+            </a:r>
+            <a:endParaRPr lang="en-US" sz="4200" dirty="0"/>
+          </a:p>
+        </p:txBody>
+      </p:sp>
+      <p:pic>
+        <p:nvPicPr>
+          <p:cNvPr id="6" name="Content Placeholder 5"/>
+          <p:cNvPicPr>
+            <a:picLocks noGrp="1" noChangeAspect="1"/>
+          </p:cNvPicPr>
+          <p:nvPr>
+            <p:ph idx="1"/>
+          </p:nvPr>
+        </p:nvPicPr>
+        <p:blipFill rotWithShape="1">
+          <a:blip r:embed="rId2"/>
+          <a:srcRect l="2260" t="4145" r="2321" b="8483"/>
+          <a:stretch/>
+        </p:blipFill>
+        <p:spPr>
+          <a:xfrm>
+            <a:off x="3403600" y="1223962"/>
+            <a:ext cx="5524500" cy="5537942"/>
+          </a:xfrm>
+          <a:prstGeom prst="rect">
+            <a:avLst/>
+          </a:prstGeom>
+        </p:spPr>
+      </p:pic>
+    </p:spTree>
+    <p:extLst>
+      <p:ext uri="{BB962C8B-B14F-4D97-AF65-F5344CB8AC3E}">
+        <p14:creationId xmlns:p14="http://schemas.microsoft.com/office/powerpoint/2010/main" val="3704594105"/>
+      </p:ext>
+    </p:extLst>
+  </p:cSld>
+  <p:clrMapOvr>
+    <a:masterClrMapping/>
+  </p:clrMapOvr>
+</p:sld>
+</file>
+
+<file path=ppt/slides/slide11.xml><?xml version="1.0" encoding="utf-8"?>
+<p:sld xmlns:a="http://schemas.openxmlformats.org/drawingml/2006/main" xmlns:r="http://schemas.openxmlformats.org/officeDocument/2006/relationships" xmlns:p="http://schemas.openxmlformats.org/presentationml/2006/main">
+  <p:cSld>
+    <p:spTree>
+      <p:nvGrpSpPr>
+        <p:cNvPr id="1" name=""/>
+        <p:cNvGrpSpPr/>
+        <p:nvPr/>
+      </p:nvGrpSpPr>
+      <p:grpSpPr>
+        <a:xfrm>
+          <a:off x="0" y="0"/>
+          <a:ext cx="0" cy="0"/>
+          <a:chOff x="0" y="0"/>
+          <a:chExt cx="0" cy="0"/>
+        </a:xfrm>
+      </p:grpSpPr>
+      <p:sp>
+        <p:nvSpPr>
+          <p:cNvPr id="2" name="Title 1"/>
+          <p:cNvSpPr>
+            <a:spLocks noGrp="1"/>
+          </p:cNvSpPr>
+          <p:nvPr>
+            <p:ph type="title"/>
+          </p:nvPr>
+        </p:nvSpPr>
+        <p:spPr>
+          <a:xfrm>
             <a:off x="1261872" y="-2540"/>
             <a:ext cx="9692640" cy="1325562"/>
           </a:xfrm>
@@ -3624,7 +3711,7 @@
 </p:sld>
 </file>
 
-<file path=ppt/slides/slide11.xml><?xml version="1.0" encoding="utf-8"?>
+<file path=ppt/slides/slide12.xml><?xml version="1.0" encoding="utf-8"?>
 <p:sld xmlns:a="http://schemas.openxmlformats.org/drawingml/2006/main" xmlns:r="http://schemas.openxmlformats.org/officeDocument/2006/relationships" xmlns:p="http://schemas.openxmlformats.org/presentationml/2006/main">
   <p:cSld>
     <p:spTree>
@@ -3702,100 +3789,6 @@
     <p:extLst>
       <p:ext uri="{BB962C8B-B14F-4D97-AF65-F5344CB8AC3E}">
         <p14:creationId xmlns:p14="http://schemas.microsoft.com/office/powerpoint/2010/main" val="3679955805"/>
-      </p:ext>
-    </p:extLst>
-  </p:cSld>
-  <p:clrMapOvr>
-    <a:masterClrMapping/>
-  </p:clrMapOvr>
-  <p:timing>
-    <p:tnLst>
-      <p:par>
-        <p:cTn id="1" dur="indefinite" restart="never" nodeType="tmRoot"/>
-      </p:par>
-    </p:tnLst>
-  </p:timing>
-</p:sld>
-</file>
-
-<file path=ppt/slides/slide12.xml><?xml version="1.0" encoding="utf-8"?>
-<p:sld xmlns:a="http://schemas.openxmlformats.org/drawingml/2006/main" xmlns:r="http://schemas.openxmlformats.org/officeDocument/2006/relationships" xmlns:p="http://schemas.openxmlformats.org/presentationml/2006/main">
-  <p:cSld>
-    <p:spTree>
-      <p:nvGrpSpPr>
-        <p:cNvPr id="1" name=""/>
-        <p:cNvGrpSpPr/>
-        <p:nvPr/>
-      </p:nvGrpSpPr>
-      <p:grpSpPr>
-        <a:xfrm>
-          <a:off x="0" y="0"/>
-          <a:ext cx="0" cy="0"/>
-          <a:chOff x="0" y="0"/>
-          <a:chExt cx="0" cy="0"/>
-        </a:xfrm>
-      </p:grpSpPr>
-      <p:sp>
-        <p:nvSpPr>
-          <p:cNvPr id="2" name="Title 1"/>
-          <p:cNvSpPr>
-            <a:spLocks noGrp="1"/>
-          </p:cNvSpPr>
-          <p:nvPr>
-            <p:ph type="title"/>
-          </p:nvPr>
-        </p:nvSpPr>
-        <p:spPr>
-          <a:xfrm>
-            <a:off x="1341386" y="-124571"/>
-            <a:ext cx="9692640" cy="1325562"/>
-          </a:xfrm>
-        </p:spPr>
-        <p:txBody>
-          <a:bodyPr/>
-          <a:lstStyle/>
-          <a:p>
-            <a:r>
-              <a:rPr lang="en-US" dirty="0" smtClean="0"/>
-              <a:t>Staff Registration</a:t>
-            </a:r>
-            <a:endParaRPr lang="en-US" dirty="0"/>
-          </a:p>
-        </p:txBody>
-      </p:sp>
-      <p:pic>
-        <p:nvPicPr>
-          <p:cNvPr id="4" name="Content Placeholder 3"/>
-          <p:cNvPicPr>
-            <a:picLocks noGrp="1" noChangeAspect="1"/>
-          </p:cNvPicPr>
-          <p:nvPr>
-            <p:ph idx="1"/>
-          </p:nvPr>
-        </p:nvPicPr>
-        <p:blipFill>
-          <a:blip r:embed="rId2">
-            <a:extLst>
-              <a:ext uri="{28A0092B-C50C-407E-A947-70E740481C1C}">
-                <a14:useLocalDpi xmlns:a14="http://schemas.microsoft.com/office/drawing/2010/main" val="0"/>
-              </a:ext>
-            </a:extLst>
-          </a:blip>
-          <a:stretch>
-            <a:fillRect/>
-          </a:stretch>
-        </p:blipFill>
-        <p:spPr>
-          <a:xfrm>
-            <a:off x="3110072" y="1033671"/>
-            <a:ext cx="4867737" cy="5904034"/>
-          </a:xfrm>
-        </p:spPr>
-      </p:pic>
-    </p:spTree>
-    <p:extLst>
-      <p:ext uri="{BB962C8B-B14F-4D97-AF65-F5344CB8AC3E}">
-        <p14:creationId xmlns:p14="http://schemas.microsoft.com/office/powerpoint/2010/main" val="1478987722"/>
       </p:ext>
     </p:extLst>
   </p:cSld>
@@ -4067,6 +4060,204 @@
 </p:sld>
 </file>
 
+<file path=ppt/slides/slide16.xml><?xml version="1.0" encoding="utf-8"?>
+<p:sld xmlns:a="http://schemas.openxmlformats.org/drawingml/2006/main" xmlns:r="http://schemas.openxmlformats.org/officeDocument/2006/relationships" xmlns:p="http://schemas.openxmlformats.org/presentationml/2006/main">
+  <p:cSld>
+    <p:spTree>
+      <p:nvGrpSpPr>
+        <p:cNvPr id="1" name=""/>
+        <p:cNvGrpSpPr/>
+        <p:nvPr/>
+      </p:nvGrpSpPr>
+      <p:grpSpPr>
+        <a:xfrm>
+          <a:off x="0" y="0"/>
+          <a:ext cx="0" cy="0"/>
+          <a:chOff x="0" y="0"/>
+          <a:chExt cx="0" cy="0"/>
+        </a:xfrm>
+      </p:grpSpPr>
+      <p:sp>
+        <p:nvSpPr>
+          <p:cNvPr id="2" name="Title 1"/>
+          <p:cNvSpPr>
+            <a:spLocks noGrp="1"/>
+          </p:cNvSpPr>
+          <p:nvPr>
+            <p:ph type="title"/>
+          </p:nvPr>
+        </p:nvSpPr>
+        <p:spPr>
+          <a:xfrm>
+            <a:off x="1261872" y="0"/>
+            <a:ext cx="9692640" cy="1060174"/>
+          </a:xfrm>
+        </p:spPr>
+        <p:txBody>
+          <a:bodyPr/>
+          <a:lstStyle/>
+          <a:p>
+            <a:r>
+              <a:rPr lang="en-US" dirty="0">
+                <a:solidFill>
+                  <a:srgbClr val="002060"/>
+                </a:solidFill>
+              </a:rPr>
+              <a:t>Product Cart Page </a:t>
+            </a:r>
+            <a:r>
+              <a:rPr lang="en-US" dirty="0" smtClean="0">
+                <a:solidFill>
+                  <a:srgbClr val="002060"/>
+                </a:solidFill>
+              </a:rPr>
+              <a:t>Design</a:t>
+            </a:r>
+            <a:endParaRPr lang="en-US" dirty="0"/>
+          </a:p>
+        </p:txBody>
+      </p:sp>
+      <p:pic>
+        <p:nvPicPr>
+          <p:cNvPr id="4" name="Content Placeholder 3"/>
+          <p:cNvPicPr>
+            <a:picLocks noGrp="1" noChangeAspect="1"/>
+          </p:cNvPicPr>
+          <p:nvPr>
+            <p:ph idx="1"/>
+          </p:nvPr>
+        </p:nvPicPr>
+        <p:blipFill>
+          <a:blip r:embed="rId2">
+            <a:extLst>
+              <a:ext uri="{28A0092B-C50C-407E-A947-70E740481C1C}">
+                <a14:useLocalDpi xmlns:a14="http://schemas.microsoft.com/office/drawing/2010/main" val="0"/>
+              </a:ext>
+            </a:extLst>
+          </a:blip>
+          <a:stretch>
+            <a:fillRect/>
+          </a:stretch>
+        </p:blipFill>
+        <p:spPr>
+          <a:xfrm>
+            <a:off x="2078089" y="1206223"/>
+            <a:ext cx="7277945" cy="5675585"/>
+          </a:xfrm>
+        </p:spPr>
+      </p:pic>
+    </p:spTree>
+    <p:extLst>
+      <p:ext uri="{BB962C8B-B14F-4D97-AF65-F5344CB8AC3E}">
+        <p14:creationId xmlns:p14="http://schemas.microsoft.com/office/powerpoint/2010/main" val="1005362740"/>
+      </p:ext>
+    </p:extLst>
+  </p:cSld>
+  <p:clrMapOvr>
+    <a:masterClrMapping/>
+  </p:clrMapOvr>
+</p:sld>
+</file>
+
+<file path=ppt/slides/slide17.xml><?xml version="1.0" encoding="utf-8"?>
+<p:sld xmlns:a="http://schemas.openxmlformats.org/drawingml/2006/main" xmlns:r="http://schemas.openxmlformats.org/officeDocument/2006/relationships" xmlns:p="http://schemas.openxmlformats.org/presentationml/2006/main">
+  <p:cSld>
+    <p:spTree>
+      <p:nvGrpSpPr>
+        <p:cNvPr id="1" name=""/>
+        <p:cNvGrpSpPr/>
+        <p:nvPr/>
+      </p:nvGrpSpPr>
+      <p:grpSpPr>
+        <a:xfrm>
+          <a:off x="0" y="0"/>
+          <a:ext cx="0" cy="0"/>
+          <a:chOff x="0" y="0"/>
+          <a:chExt cx="0" cy="0"/>
+        </a:xfrm>
+      </p:grpSpPr>
+      <p:sp>
+        <p:nvSpPr>
+          <p:cNvPr id="2" name="Title 1"/>
+          <p:cNvSpPr>
+            <a:spLocks noGrp="1"/>
+          </p:cNvSpPr>
+          <p:nvPr>
+            <p:ph type="title"/>
+          </p:nvPr>
+        </p:nvSpPr>
+        <p:spPr>
+          <a:xfrm>
+            <a:off x="1261872" y="-5296"/>
+            <a:ext cx="9692640" cy="1197992"/>
+          </a:xfrm>
+        </p:spPr>
+        <p:txBody>
+          <a:bodyPr/>
+          <a:lstStyle/>
+          <a:p>
+            <a:r>
+              <a:rPr lang="en-US" dirty="0">
+                <a:solidFill>
+                  <a:srgbClr val="002060"/>
+                </a:solidFill>
+              </a:rPr>
+              <a:t>Place Order Page </a:t>
+            </a:r>
+            <a:r>
+              <a:rPr lang="en-US" dirty="0" smtClean="0">
+                <a:solidFill>
+                  <a:srgbClr val="002060"/>
+                </a:solidFill>
+              </a:rPr>
+              <a:t>Design</a:t>
+            </a:r>
+            <a:endParaRPr lang="en-US" dirty="0"/>
+          </a:p>
+        </p:txBody>
+      </p:sp>
+      <p:pic>
+        <p:nvPicPr>
+          <p:cNvPr id="4" name="Content Placeholder 3"/>
+          <p:cNvPicPr>
+            <a:picLocks noGrp="1" noChangeAspect="1"/>
+          </p:cNvPicPr>
+          <p:nvPr>
+            <p:ph idx="1"/>
+          </p:nvPr>
+        </p:nvPicPr>
+        <p:blipFill>
+          <a:blip r:embed="rId2">
+            <a:extLst>
+              <a:ext uri="{28A0092B-C50C-407E-A947-70E740481C1C}">
+                <a14:useLocalDpi xmlns:a14="http://schemas.microsoft.com/office/drawing/2010/main" val="0"/>
+              </a:ext>
+            </a:extLst>
+          </a:blip>
+          <a:stretch>
+            <a:fillRect/>
+          </a:stretch>
+        </p:blipFill>
+        <p:spPr>
+          <a:xfrm>
+            <a:off x="2286045" y="1192696"/>
+            <a:ext cx="7644293" cy="5496581"/>
+          </a:xfrm>
+        </p:spPr>
+      </p:pic>
+    </p:spTree>
+    <p:extLst>
+      <p:ext uri="{BB962C8B-B14F-4D97-AF65-F5344CB8AC3E}">
+        <p14:creationId xmlns:p14="http://schemas.microsoft.com/office/powerpoint/2010/main" val="1275428707"/>
+      </p:ext>
+    </p:extLst>
+  </p:cSld>
+  <p:clrMapOvr>
+    <a:masterClrMapping/>
+  </p:clrMapOvr>
+</p:sld>
+</file>
+
 <file path=ppt/slides/slide2.xml><?xml version="1.0" encoding="utf-8"?>
 <p:sld xmlns:a="http://schemas.openxmlformats.org/drawingml/2006/main" xmlns:r="http://schemas.openxmlformats.org/officeDocument/2006/relationships" xmlns:p="http://schemas.openxmlformats.org/presentationml/2006/main">
   <p:cSld>
@@ -4200,16 +4391,7 @@
                 </a:solidFill>
                 <a:hlinkClick r:id="rId5" action="ppaction://hlinksldjump"/>
               </a:rPr>
-              <a:t>Login </a:t>
-            </a:r>
-            <a:r>
-              <a:rPr lang="en-US" dirty="0" smtClean="0">
-                <a:solidFill>
-                  <a:srgbClr val="002060"/>
-                </a:solidFill>
-                <a:hlinkClick r:id="rId5" action="ppaction://hlinksldjump"/>
-              </a:rPr>
-              <a:t>page</a:t>
+              <a:t>Login page</a:t>
             </a:r>
             <a:endParaRPr lang="en-US" dirty="0" smtClean="0">
               <a:solidFill>
@@ -4332,56 +4514,35 @@
               <a:buSzPct val="80000"/>
             </a:pPr>
             <a:r>
-              <a:rPr lang="en-US" dirty="0" smtClean="0">
+              <a:rPr lang="en-US" smtClean="0">
                 <a:solidFill>
                   <a:srgbClr val="002060"/>
                 </a:solidFill>
                 <a:hlinkClick r:id="rId10" action="ppaction://hlinksldjump"/>
               </a:rPr>
-              <a:t>Customer Registration</a:t>
-            </a:r>
-            <a:endParaRPr lang="en-US" dirty="0" smtClean="0">
+              <a:t>Customer </a:t>
+            </a:r>
+            <a:r>
+              <a:rPr lang="en-US" smtClean="0">
+                <a:solidFill>
+                  <a:srgbClr val="002060"/>
+                </a:solidFill>
+                <a:hlinkClick r:id="rId10" action="ppaction://hlinksldjump"/>
+              </a:rPr>
+              <a:t>Registration</a:t>
+            </a:r>
+            <a:endParaRPr lang="en-US">
               <a:solidFill>
                 <a:srgbClr val="002060"/>
               </a:solidFill>
             </a:endParaRPr>
           </a:p>
           <a:p>
-            <a:pPr lvl="1">
+            <a:pPr marL="182563" lvl="1" indent="-182563">
               <a:buSzPct val="80000"/>
             </a:pPr>
             <a:r>
-              <a:rPr lang="en-US" dirty="0" smtClean="0">
-                <a:solidFill>
-                  <a:srgbClr val="002060"/>
-                </a:solidFill>
-                <a:hlinkClick r:id="rId11" action="ppaction://hlinksldjump"/>
-              </a:rPr>
-              <a:t>Staff Registration</a:t>
-            </a:r>
-            <a:endParaRPr lang="en-US" dirty="0">
-              <a:solidFill>
-                <a:srgbClr val="002060"/>
-              </a:solidFill>
-            </a:endParaRPr>
-          </a:p>
-          <a:p>
-            <a:pPr marL="182880" lvl="1">
-              <a:lnSpc>
-                <a:spcPct val="95000"/>
-              </a:lnSpc>
-              <a:spcBef>
-                <a:spcPts val="1400"/>
-              </a:spcBef>
-              <a:spcAft>
-                <a:spcPts val="200"/>
-              </a:spcAft>
-              <a:buSzPct val="80000"/>
-              <a:buFont typeface="Arial" pitchFamily="34" charset="0"/>
-              <a:buChar char="•"/>
-            </a:pPr>
-            <a:r>
-              <a:rPr lang="en-US" sz="1800" spc="10" dirty="0">
+              <a:rPr lang="en-US" sz="1800" spc="10" smtClean="0">
                 <a:solidFill>
                   <a:srgbClr val="002060"/>
                 </a:solidFill>
@@ -4409,7 +4570,7 @@
                 <a:solidFill>
                   <a:srgbClr val="002060"/>
                 </a:solidFill>
-                <a:hlinkClick r:id="rId12" action="ppaction://hlinksldjump"/>
+                <a:hlinkClick r:id="rId11" action="ppaction://hlinksldjump"/>
               </a:rPr>
               <a:t>Product list</a:t>
             </a:r>
@@ -4431,18 +4592,9 @@
                 <a:solidFill>
                   <a:srgbClr val="002060"/>
                 </a:solidFill>
-                <a:hlinkClick r:id="rId13" action="ppaction://hlinksldjump"/>
+                <a:hlinkClick r:id="rId12" action="ppaction://hlinksldjump"/>
               </a:rPr>
-              <a:t>Product </a:t>
-            </a:r>
-            <a:r>
-              <a:rPr lang="en-US" dirty="0">
-                <a:solidFill>
-                  <a:srgbClr val="002060"/>
-                </a:solidFill>
-                <a:hlinkClick r:id="rId13" action="ppaction://hlinksldjump"/>
-              </a:rPr>
-              <a:t>list Design</a:t>
+              <a:t>Product list Design</a:t>
             </a:r>
             <a:endParaRPr lang="en-US" dirty="0">
               <a:solidFill>
@@ -4531,67 +4683,245 @@
           <a:chExt cx="0" cy="0"/>
         </a:xfrm>
       </p:grpSpPr>
-      <p:pic>
-        <p:nvPicPr>
-          <p:cNvPr id="5" name="Content Placeholder 4"/>
-          <p:cNvPicPr>
-            <a:picLocks noGrp="1" noChangeAspect="1"/>
-          </p:cNvPicPr>
-          <p:nvPr>
-            <p:ph idx="1"/>
-          </p:nvPr>
-        </p:nvPicPr>
-        <p:blipFill>
-          <a:blip r:embed="rId2">
-            <a:extLst>
-              <a:ext uri="{28A0092B-C50C-407E-A947-70E740481C1C}">
-                <a14:useLocalDpi xmlns:a14="http://schemas.microsoft.com/office/drawing/2010/main" val="0"/>
-              </a:ext>
-            </a:extLst>
-          </a:blip>
-          <a:stretch>
-            <a:fillRect/>
-          </a:stretch>
-        </p:blipFill>
+      <p:sp>
+        <p:nvSpPr>
+          <p:cNvPr id="2" name="Title 1"/>
+          <p:cNvSpPr>
+            <a:spLocks noGrp="1"/>
+          </p:cNvSpPr>
+          <p:nvPr>
+            <p:ph type="title"/>
+          </p:nvPr>
+        </p:nvSpPr>
         <p:spPr>
           <a:xfrm>
-            <a:off x="3702342" y="176701"/>
-            <a:ext cx="6303049" cy="6421976"/>
+            <a:off x="1261872" y="0"/>
+            <a:ext cx="9692640" cy="1038970"/>
           </a:xfrm>
         </p:spPr>
-      </p:pic>
-      <p:sp>
-        <p:nvSpPr>
-          <p:cNvPr id="2" name="Title 1"/>
-          <p:cNvSpPr>
-            <a:spLocks noGrp="1"/>
-          </p:cNvSpPr>
-          <p:nvPr>
-            <p:ph type="title"/>
+        <p:txBody>
+          <a:bodyPr/>
+          <a:lstStyle/>
+          <a:p>
+            <a:r>
+              <a:rPr lang="en-US" dirty="0" smtClean="0"/>
+              <a:t>Continue…</a:t>
+            </a:r>
+            <a:endParaRPr lang="en-US" dirty="0"/>
+          </a:p>
+        </p:txBody>
+      </p:sp>
+      <p:sp>
+        <p:nvSpPr>
+          <p:cNvPr id="6" name="Content Placeholder 2"/>
+          <p:cNvSpPr>
+            <a:spLocks noGrp="1"/>
+          </p:cNvSpPr>
+          <p:nvPr>
+            <p:ph idx="1"/>
           </p:nvPr>
         </p:nvSpPr>
         <p:spPr>
           <a:xfrm>
-            <a:off x="970324" y="0"/>
-            <a:ext cx="9692640" cy="1325562"/>
+            <a:off x="1261872" y="1166538"/>
+            <a:ext cx="8595360" cy="5539062"/>
           </a:xfrm>
         </p:spPr>
         <p:txBody>
-          <a:bodyPr/>
-          <a:lstStyle/>
-          <a:p>
-            <a:r>
-              <a:rPr lang="en-US" dirty="0" smtClean="0"/>
-              <a:t>ER Diagram</a:t>
-            </a:r>
-            <a:endParaRPr lang="en-US" dirty="0"/>
+          <a:bodyPr>
+            <a:normAutofit/>
+          </a:bodyPr>
+          <a:lstStyle/>
+          <a:p>
+            <a:r>
+              <a:rPr lang="en-US" dirty="0" smtClean="0">
+                <a:solidFill>
+                  <a:srgbClr val="002060"/>
+                </a:solidFill>
+              </a:rPr>
+              <a:t>Product Cart Page Design</a:t>
+            </a:r>
+          </a:p>
+          <a:p>
+            <a:pPr lvl="1">
+              <a:lnSpc>
+                <a:spcPct val="100000"/>
+              </a:lnSpc>
+              <a:buSzPct val="80000"/>
+            </a:pPr>
+            <a:r>
+              <a:rPr lang="en-US" dirty="0">
+                <a:solidFill>
+                  <a:srgbClr val="002060"/>
+                </a:solidFill>
+                <a:hlinkClick r:id="rId2" action="ppaction://hlinksldjump"/>
+              </a:rPr>
+              <a:t>Product Cart Page</a:t>
+            </a:r>
+            <a:endParaRPr lang="en-US" dirty="0">
+              <a:solidFill>
+                <a:srgbClr val="002060"/>
+              </a:solidFill>
+            </a:endParaRPr>
+          </a:p>
+          <a:p>
+            <a:pPr lvl="1">
+              <a:lnSpc>
+                <a:spcPct val="100000"/>
+              </a:lnSpc>
+              <a:buSzPct val="80000"/>
+            </a:pPr>
+            <a:r>
+              <a:rPr lang="en-US" dirty="0">
+                <a:solidFill>
+                  <a:srgbClr val="002060"/>
+                </a:solidFill>
+                <a:hlinkClick r:id="rId2" action="ppaction://hlinksldjump"/>
+              </a:rPr>
+              <a:t>Product Cart </a:t>
+            </a:r>
+            <a:r>
+              <a:rPr lang="en-US" dirty="0" smtClean="0">
+                <a:solidFill>
+                  <a:srgbClr val="002060"/>
+                </a:solidFill>
+                <a:hlinkClick r:id="rId2" action="ppaction://hlinksldjump"/>
+              </a:rPr>
+              <a:t>Page Design</a:t>
+            </a:r>
+            <a:endParaRPr lang="en-US" dirty="0">
+              <a:solidFill>
+                <a:srgbClr val="002060"/>
+              </a:solidFill>
+            </a:endParaRPr>
+          </a:p>
+          <a:p>
+            <a:r>
+              <a:rPr lang="en-US" dirty="0" smtClean="0">
+                <a:solidFill>
+                  <a:srgbClr val="002060"/>
+                </a:solidFill>
+              </a:rPr>
+              <a:t>Place Order Page </a:t>
+            </a:r>
+            <a:r>
+              <a:rPr lang="en-US" dirty="0">
+                <a:solidFill>
+                  <a:srgbClr val="002060"/>
+                </a:solidFill>
+              </a:rPr>
+              <a:t>Design</a:t>
+            </a:r>
+          </a:p>
+          <a:p>
+            <a:pPr lvl="1">
+              <a:lnSpc>
+                <a:spcPct val="100000"/>
+              </a:lnSpc>
+              <a:buSzPct val="80000"/>
+            </a:pPr>
+            <a:r>
+              <a:rPr lang="en-US" dirty="0">
+                <a:solidFill>
+                  <a:srgbClr val="002060"/>
+                </a:solidFill>
+              </a:rPr>
+              <a:t>Place Order </a:t>
+            </a:r>
+            <a:r>
+              <a:rPr lang="en-US" dirty="0" smtClean="0">
+                <a:solidFill>
+                  <a:srgbClr val="002060"/>
+                </a:solidFill>
+              </a:rPr>
+              <a:t>Page</a:t>
+            </a:r>
+          </a:p>
+          <a:p>
+            <a:pPr lvl="1">
+              <a:lnSpc>
+                <a:spcPct val="100000"/>
+              </a:lnSpc>
+              <a:buSzPct val="80000"/>
+            </a:pPr>
+            <a:r>
+              <a:rPr lang="en-US" dirty="0" smtClean="0">
+                <a:solidFill>
+                  <a:srgbClr val="002060"/>
+                </a:solidFill>
+              </a:rPr>
+              <a:t>Place </a:t>
+            </a:r>
+            <a:r>
+              <a:rPr lang="en-US" dirty="0">
+                <a:solidFill>
+                  <a:srgbClr val="002060"/>
+                </a:solidFill>
+              </a:rPr>
+              <a:t>Order </a:t>
+            </a:r>
+            <a:r>
+              <a:rPr lang="en-US" dirty="0" smtClean="0">
+                <a:solidFill>
+                  <a:srgbClr val="002060"/>
+                </a:solidFill>
+              </a:rPr>
+              <a:t>Page Design</a:t>
+            </a:r>
+            <a:endParaRPr lang="en-US" dirty="0">
+              <a:solidFill>
+                <a:srgbClr val="002060"/>
+              </a:solidFill>
+            </a:endParaRPr>
+          </a:p>
+          <a:p>
+            <a:pPr marL="457200" lvl="2">
+              <a:lnSpc>
+                <a:spcPct val="95000"/>
+              </a:lnSpc>
+              <a:spcBef>
+                <a:spcPts val="1400"/>
+              </a:spcBef>
+              <a:spcAft>
+                <a:spcPts val="200"/>
+              </a:spcAft>
+              <a:buSzPct val="80000"/>
+              <a:buFont typeface="Arial" pitchFamily="34" charset="0"/>
+              <a:buChar char="•"/>
+            </a:pPr>
+            <a:endParaRPr lang="en-US" spc="10" dirty="0" smtClean="0">
+              <a:solidFill>
+                <a:schemeClr val="tx1"/>
+              </a:solidFill>
+            </a:endParaRPr>
+          </a:p>
+          <a:p>
+            <a:pPr marL="182880" lvl="1">
+              <a:lnSpc>
+                <a:spcPct val="95000"/>
+              </a:lnSpc>
+              <a:spcBef>
+                <a:spcPts val="1400"/>
+              </a:spcBef>
+              <a:spcAft>
+                <a:spcPts val="200"/>
+              </a:spcAft>
+              <a:buSzPct val="80000"/>
+              <a:buFont typeface="Arial" pitchFamily="34" charset="0"/>
+              <a:buChar char="•"/>
+            </a:pPr>
+            <a:endParaRPr lang="en-US" sz="1800" spc="10" dirty="0">
+              <a:solidFill>
+                <a:schemeClr val="tx1"/>
+              </a:solidFill>
+            </a:endParaRPr>
           </a:p>
         </p:txBody>
       </p:sp>
     </p:spTree>
     <p:extLst>
       <p:ext uri="{BB962C8B-B14F-4D97-AF65-F5344CB8AC3E}">
-        <p14:creationId xmlns:p14="http://schemas.microsoft.com/office/powerpoint/2010/main" val="258305463"/>
+        <p14:creationId xmlns:p14="http://schemas.microsoft.com/office/powerpoint/2010/main" val="401095384"/>
       </p:ext>
     </p:extLst>
   </p:cSld>
@@ -4620,7 +4950,7 @@
       </p:grpSpPr>
       <p:pic>
         <p:nvPicPr>
-          <p:cNvPr id="4" name="Content Placeholder 3"/>
+          <p:cNvPr id="5" name="Content Placeholder 4"/>
           <p:cNvPicPr>
             <a:picLocks noGrp="1" noChangeAspect="1"/>
           </p:cNvPicPr>
@@ -4642,8 +4972,8 @@
         </p:blipFill>
         <p:spPr>
           <a:xfrm>
-            <a:off x="4902200" y="279401"/>
-            <a:ext cx="5194300" cy="6477658"/>
+            <a:off x="3702342" y="176701"/>
+            <a:ext cx="6303049" cy="6421976"/>
           </a:xfrm>
         </p:spPr>
       </p:pic>
@@ -4659,7 +4989,7 @@
         </p:nvSpPr>
         <p:spPr>
           <a:xfrm>
-            <a:off x="830072" y="-142240"/>
+            <a:off x="970324" y="0"/>
             <a:ext cx="9692640" cy="1325562"/>
           </a:xfrm>
         </p:spPr>
@@ -4669,7 +4999,7 @@
           <a:p>
             <a:r>
               <a:rPr lang="en-US" dirty="0" smtClean="0"/>
-              <a:t>Use case Diagram</a:t>
+              <a:t>ER Diagram</a:t>
             </a:r>
             <a:endParaRPr lang="en-US" dirty="0"/>
           </a:p>
@@ -4678,7 +5008,7 @@
     </p:spTree>
     <p:extLst>
       <p:ext uri="{BB962C8B-B14F-4D97-AF65-F5344CB8AC3E}">
-        <p14:creationId xmlns:p14="http://schemas.microsoft.com/office/powerpoint/2010/main" val="2315716299"/>
+        <p14:creationId xmlns:p14="http://schemas.microsoft.com/office/powerpoint/2010/main" val="258305463"/>
       </p:ext>
     </p:extLst>
   </p:cSld>
@@ -4716,7 +5046,7 @@
           </p:nvPr>
         </p:nvPicPr>
         <p:blipFill>
-          <a:blip r:embed="rId2" cstate="print">
+          <a:blip r:embed="rId2">
             <a:extLst>
               <a:ext uri="{28A0092B-C50C-407E-A947-70E740481C1C}">
                 <a14:useLocalDpi xmlns:a14="http://schemas.microsoft.com/office/drawing/2010/main" val="0"/>
@@ -4729,8 +5059,8 @@
         </p:blipFill>
         <p:spPr>
           <a:xfrm>
-            <a:off x="4229371" y="0"/>
-            <a:ext cx="5590489" cy="6828338"/>
+            <a:off x="4902200" y="279401"/>
+            <a:ext cx="5194300" cy="6477658"/>
           </a:xfrm>
         </p:spPr>
       </p:pic>
@@ -4746,7 +5076,7 @@
         </p:nvSpPr>
         <p:spPr>
           <a:xfrm>
-            <a:off x="576072" y="-106016"/>
+            <a:off x="830072" y="-142240"/>
             <a:ext cx="9692640" cy="1325562"/>
           </a:xfrm>
         </p:spPr>
@@ -4756,7 +5086,7 @@
           <a:p>
             <a:r>
               <a:rPr lang="en-US" dirty="0" smtClean="0"/>
-              <a:t>Class Diagram</a:t>
+              <a:t>Use case Diagram</a:t>
             </a:r>
             <a:endParaRPr lang="en-US" dirty="0"/>
           </a:p>
@@ -4765,7 +5095,7 @@
     </p:spTree>
     <p:extLst>
       <p:ext uri="{BB962C8B-B14F-4D97-AF65-F5344CB8AC3E}">
-        <p14:creationId xmlns:p14="http://schemas.microsoft.com/office/powerpoint/2010/main" val="1467753687"/>
+        <p14:creationId xmlns:p14="http://schemas.microsoft.com/office/powerpoint/2010/main" val="2315716299"/>
       </p:ext>
     </p:extLst>
   </p:cSld>
@@ -4794,6 +5124,93 @@
       </p:grpSpPr>
       <p:pic>
         <p:nvPicPr>
+          <p:cNvPr id="4" name="Content Placeholder 3"/>
+          <p:cNvPicPr>
+            <a:picLocks noGrp="1" noChangeAspect="1"/>
+          </p:cNvPicPr>
+          <p:nvPr>
+            <p:ph idx="1"/>
+          </p:nvPr>
+        </p:nvPicPr>
+        <p:blipFill>
+          <a:blip r:embed="rId2" cstate="print">
+            <a:extLst>
+              <a:ext uri="{28A0092B-C50C-407E-A947-70E740481C1C}">
+                <a14:useLocalDpi xmlns:a14="http://schemas.microsoft.com/office/drawing/2010/main" val="0"/>
+              </a:ext>
+            </a:extLst>
+          </a:blip>
+          <a:stretch>
+            <a:fillRect/>
+          </a:stretch>
+        </p:blipFill>
+        <p:spPr>
+          <a:xfrm>
+            <a:off x="4229371" y="0"/>
+            <a:ext cx="5590489" cy="6828338"/>
+          </a:xfrm>
+        </p:spPr>
+      </p:pic>
+      <p:sp>
+        <p:nvSpPr>
+          <p:cNvPr id="2" name="Title 1"/>
+          <p:cNvSpPr>
+            <a:spLocks noGrp="1"/>
+          </p:cNvSpPr>
+          <p:nvPr>
+            <p:ph type="title"/>
+          </p:nvPr>
+        </p:nvSpPr>
+        <p:spPr>
+          <a:xfrm>
+            <a:off x="576072" y="-106016"/>
+            <a:ext cx="9692640" cy="1325562"/>
+          </a:xfrm>
+        </p:spPr>
+        <p:txBody>
+          <a:bodyPr/>
+          <a:lstStyle/>
+          <a:p>
+            <a:r>
+              <a:rPr lang="en-US" dirty="0" smtClean="0"/>
+              <a:t>Class Diagram</a:t>
+            </a:r>
+            <a:endParaRPr lang="en-US" dirty="0"/>
+          </a:p>
+        </p:txBody>
+      </p:sp>
+    </p:spTree>
+    <p:extLst>
+      <p:ext uri="{BB962C8B-B14F-4D97-AF65-F5344CB8AC3E}">
+        <p14:creationId xmlns:p14="http://schemas.microsoft.com/office/powerpoint/2010/main" val="1467753687"/>
+      </p:ext>
+    </p:extLst>
+  </p:cSld>
+  <p:clrMapOvr>
+    <a:masterClrMapping/>
+  </p:clrMapOvr>
+</p:sld>
+</file>
+
+<file path=ppt/slides/slide7.xml><?xml version="1.0" encoding="utf-8"?>
+<p:sld xmlns:a="http://schemas.openxmlformats.org/drawingml/2006/main" xmlns:r="http://schemas.openxmlformats.org/officeDocument/2006/relationships" xmlns:p="http://schemas.openxmlformats.org/presentationml/2006/main">
+  <p:cSld>
+    <p:spTree>
+      <p:nvGrpSpPr>
+        <p:cNvPr id="1" name=""/>
+        <p:cNvGrpSpPr/>
+        <p:nvPr/>
+      </p:nvGrpSpPr>
+      <p:grpSpPr>
+        <a:xfrm>
+          <a:off x="0" y="0"/>
+          <a:ext cx="0" cy="0"/>
+          <a:chOff x="0" y="0"/>
+          <a:chExt cx="0" cy="0"/>
+        </a:xfrm>
+      </p:grpSpPr>
+      <p:pic>
+        <p:nvPicPr>
           <p:cNvPr id="20" name="Content Placeholder 19"/>
           <p:cNvPicPr>
             <a:picLocks noGrp="1" noChangeAspect="1"/>
@@ -4858,7 +5275,7 @@
 </p:sld>
 </file>
 
-<file path=ppt/slides/slide7.xml><?xml version="1.0" encoding="utf-8"?>
+<file path=ppt/slides/slide8.xml><?xml version="1.0" encoding="utf-8"?>
 <p:sld xmlns:a="http://schemas.openxmlformats.org/drawingml/2006/main" xmlns:r="http://schemas.openxmlformats.org/officeDocument/2006/relationships" xmlns:p="http://schemas.openxmlformats.org/presentationml/2006/main">
   <p:cSld>
     <p:spTree>
@@ -4947,7 +5364,7 @@
 </p:sld>
 </file>
 
-<file path=ppt/slides/slide8.xml><?xml version="1.0" encoding="utf-8"?>
+<file path=ppt/slides/slide9.xml><?xml version="1.0" encoding="utf-8"?>
 <p:sld xmlns:a="http://schemas.openxmlformats.org/drawingml/2006/main" xmlns:r="http://schemas.openxmlformats.org/officeDocument/2006/relationships" xmlns:p="http://schemas.openxmlformats.org/presentationml/2006/main">
   <p:cSld>
     <p:spTree>
@@ -5021,91 +5438,6 @@
     <p:extLst>
       <p:ext uri="{BB962C8B-B14F-4D97-AF65-F5344CB8AC3E}">
         <p14:creationId xmlns:p14="http://schemas.microsoft.com/office/powerpoint/2010/main" val="2093361532"/>
-      </p:ext>
-    </p:extLst>
-  </p:cSld>
-  <p:clrMapOvr>
-    <a:masterClrMapping/>
-  </p:clrMapOvr>
-</p:sld>
-</file>
-
-<file path=ppt/slides/slide9.xml><?xml version="1.0" encoding="utf-8"?>
-<p:sld xmlns:a="http://schemas.openxmlformats.org/drawingml/2006/main" xmlns:r="http://schemas.openxmlformats.org/officeDocument/2006/relationships" xmlns:p="http://schemas.openxmlformats.org/presentationml/2006/main">
-  <p:cSld>
-    <p:spTree>
-      <p:nvGrpSpPr>
-        <p:cNvPr id="1" name=""/>
-        <p:cNvGrpSpPr/>
-        <p:nvPr/>
-      </p:nvGrpSpPr>
-      <p:grpSpPr>
-        <a:xfrm>
-          <a:off x="0" y="0"/>
-          <a:ext cx="0" cy="0"/>
-          <a:chOff x="0" y="0"/>
-          <a:chExt cx="0" cy="0"/>
-        </a:xfrm>
-      </p:grpSpPr>
-      <p:sp>
-        <p:nvSpPr>
-          <p:cNvPr id="2" name="Title 1"/>
-          <p:cNvSpPr>
-            <a:spLocks noGrp="1"/>
-          </p:cNvSpPr>
-          <p:nvPr>
-            <p:ph type="title"/>
-          </p:nvPr>
-        </p:nvSpPr>
-        <p:spPr>
-          <a:xfrm>
-            <a:off x="1193800" y="-76200"/>
-            <a:ext cx="10078212" cy="1325562"/>
-          </a:xfrm>
-        </p:spPr>
-        <p:txBody>
-          <a:bodyPr>
-            <a:normAutofit/>
-          </a:bodyPr>
-          <a:lstStyle/>
-          <a:p>
-            <a:r>
-              <a:rPr lang="en-US" sz="4200" dirty="0" smtClean="0"/>
-              <a:t>Forgot Password Verification Code Page</a:t>
-            </a:r>
-            <a:endParaRPr lang="en-US" sz="4200" dirty="0"/>
-          </a:p>
-        </p:txBody>
-      </p:sp>
-      <p:pic>
-        <p:nvPicPr>
-          <p:cNvPr id="6" name="Content Placeholder 5"/>
-          <p:cNvPicPr>
-            <a:picLocks noGrp="1" noChangeAspect="1"/>
-          </p:cNvPicPr>
-          <p:nvPr>
-            <p:ph idx="1"/>
-          </p:nvPr>
-        </p:nvPicPr>
-        <p:blipFill rotWithShape="1">
-          <a:blip r:embed="rId2"/>
-          <a:srcRect l="2260" t="4145" r="2321" b="8483"/>
-          <a:stretch/>
-        </p:blipFill>
-        <p:spPr>
-          <a:xfrm>
-            <a:off x="3403600" y="1223962"/>
-            <a:ext cx="5524500" cy="5537942"/>
-          </a:xfrm>
-          <a:prstGeom prst="rect">
-            <a:avLst/>
-          </a:prstGeom>
-        </p:spPr>
-      </p:pic>
-    </p:spTree>
-    <p:extLst>
-      <p:ext uri="{BB962C8B-B14F-4D97-AF65-F5344CB8AC3E}">
-        <p14:creationId xmlns:p14="http://schemas.microsoft.com/office/powerpoint/2010/main" val="3704594105"/>
       </p:ext>
     </p:extLst>
   </p:cSld>

</xml_diff>

<commit_message>
Add sequence diagram for payment and history
</commit_message>
<xml_diff>
--- a/Docs/ShoppingCart.pptx
+++ b/Docs/ShoppingCart.pptx
@@ -22,6 +22,8 @@
     <p:sldId id="270" r:id="rId16"/>
     <p:sldId id="273" r:id="rId17"/>
     <p:sldId id="275" r:id="rId18"/>
+    <p:sldId id="276" r:id="rId19"/>
+    <p:sldId id="277" r:id="rId20"/>
   </p:sldIdLst>
   <p:sldSz cx="12192000" cy="6858000"/>
   <p:notesSz cx="6858000" cy="9144000"/>
@@ -296,7 +298,7 @@
           <a:p>
             <a:fld id="{FC0E3BE2-2296-44B4-87B8-79CBB784B606}" type="datetimeFigureOut">
               <a:rPr lang="en-US" smtClean="0"/>
-              <a:t>6/16/2020</a:t>
+              <a:t>6/17/2020</a:t>
             </a:fld>
             <a:endParaRPr lang="en-US"/>
           </a:p>
@@ -524,7 +526,7 @@
           <a:p>
             <a:fld id="{FC0E3BE2-2296-44B4-87B8-79CBB784B606}" type="datetimeFigureOut">
               <a:rPr lang="en-US" smtClean="0"/>
-              <a:t>6/16/2020</a:t>
+              <a:t>6/17/2020</a:t>
             </a:fld>
             <a:endParaRPr lang="en-US"/>
           </a:p>
@@ -704,7 +706,7 @@
           <a:p>
             <a:fld id="{FC0E3BE2-2296-44B4-87B8-79CBB784B606}" type="datetimeFigureOut">
               <a:rPr lang="en-US" smtClean="0"/>
-              <a:t>6/16/2020</a:t>
+              <a:t>6/17/2020</a:t>
             </a:fld>
             <a:endParaRPr lang="en-US"/>
           </a:p>
@@ -874,7 +876,7 @@
           <a:p>
             <a:fld id="{FC0E3BE2-2296-44B4-87B8-79CBB784B606}" type="datetimeFigureOut">
               <a:rPr lang="en-US" smtClean="0"/>
-              <a:t>6/16/2020</a:t>
+              <a:t>6/17/2020</a:t>
             </a:fld>
             <a:endParaRPr lang="en-US"/>
           </a:p>
@@ -1128,7 +1130,7 @@
           <a:p>
             <a:fld id="{FC0E3BE2-2296-44B4-87B8-79CBB784B606}" type="datetimeFigureOut">
               <a:rPr lang="en-US" smtClean="0"/>
-              <a:t>6/16/2020</a:t>
+              <a:t>6/17/2020</a:t>
             </a:fld>
             <a:endParaRPr lang="en-US"/>
           </a:p>
@@ -1454,7 +1456,7 @@
           <a:p>
             <a:fld id="{FC0E3BE2-2296-44B4-87B8-79CBB784B606}" type="datetimeFigureOut">
               <a:rPr lang="en-US" smtClean="0"/>
-              <a:t>6/16/2020</a:t>
+              <a:t>6/17/2020</a:t>
             </a:fld>
             <a:endParaRPr lang="en-US"/>
           </a:p>
@@ -1905,7 +1907,7 @@
           <a:p>
             <a:fld id="{FC0E3BE2-2296-44B4-87B8-79CBB784B606}" type="datetimeFigureOut">
               <a:rPr lang="en-US" smtClean="0"/>
-              <a:t>6/16/2020</a:t>
+              <a:t>6/17/2020</a:t>
             </a:fld>
             <a:endParaRPr lang="en-US"/>
           </a:p>
@@ -2023,7 +2025,7 @@
           <a:p>
             <a:fld id="{FC0E3BE2-2296-44B4-87B8-79CBB784B606}" type="datetimeFigureOut">
               <a:rPr lang="en-US" smtClean="0"/>
-              <a:t>6/16/2020</a:t>
+              <a:t>6/17/2020</a:t>
             </a:fld>
             <a:endParaRPr lang="en-US"/>
           </a:p>
@@ -2118,7 +2120,7 @@
           <a:p>
             <a:fld id="{FC0E3BE2-2296-44B4-87B8-79CBB784B606}" type="datetimeFigureOut">
               <a:rPr lang="en-US" smtClean="0"/>
-              <a:t>6/16/2020</a:t>
+              <a:t>6/17/2020</a:t>
             </a:fld>
             <a:endParaRPr lang="en-US"/>
           </a:p>
@@ -2405,7 +2407,7 @@
           <a:p>
             <a:fld id="{FC0E3BE2-2296-44B4-87B8-79CBB784B606}" type="datetimeFigureOut">
               <a:rPr lang="en-US" smtClean="0"/>
-              <a:t>6/16/2020</a:t>
+              <a:t>6/17/2020</a:t>
             </a:fld>
             <a:endParaRPr lang="en-US"/>
           </a:p>
@@ -2727,7 +2729,7 @@
           <a:p>
             <a:fld id="{FC0E3BE2-2296-44B4-87B8-79CBB784B606}" type="datetimeFigureOut">
               <a:rPr lang="en-US" smtClean="0"/>
-              <a:t>6/16/2020</a:t>
+              <a:t>6/17/2020</a:t>
             </a:fld>
             <a:endParaRPr lang="en-US"/>
           </a:p>
@@ -2981,7 +2983,7 @@
           <a:p>
             <a:fld id="{FC0E3BE2-2296-44B4-87B8-79CBB784B606}" type="datetimeFigureOut">
               <a:rPr lang="en-US" smtClean="0"/>
-              <a:t>6/16/2020</a:t>
+              <a:t>6/17/2020</a:t>
             </a:fld>
             <a:endParaRPr lang="en-US"/>
           </a:p>
@@ -4258,6 +4260,180 @@
 </p:sld>
 </file>
 
+<file path=ppt/slides/slide18.xml><?xml version="1.0" encoding="utf-8"?>
+<p:sld xmlns:a="http://schemas.openxmlformats.org/drawingml/2006/main" xmlns:r="http://schemas.openxmlformats.org/officeDocument/2006/relationships" xmlns:p="http://schemas.openxmlformats.org/presentationml/2006/main">
+  <p:cSld>
+    <p:spTree>
+      <p:nvGrpSpPr>
+        <p:cNvPr id="1" name=""/>
+        <p:cNvGrpSpPr/>
+        <p:nvPr/>
+      </p:nvGrpSpPr>
+      <p:grpSpPr>
+        <a:xfrm>
+          <a:off x="0" y="0"/>
+          <a:ext cx="0" cy="0"/>
+          <a:chOff x="0" y="0"/>
+          <a:chExt cx="0" cy="0"/>
+        </a:xfrm>
+      </p:grpSpPr>
+      <p:sp>
+        <p:nvSpPr>
+          <p:cNvPr id="2" name="Title 1"/>
+          <p:cNvSpPr>
+            <a:spLocks noGrp="1"/>
+          </p:cNvSpPr>
+          <p:nvPr>
+            <p:ph type="title"/>
+          </p:nvPr>
+        </p:nvSpPr>
+        <p:spPr>
+          <a:xfrm>
+            <a:off x="1261872" y="-45054"/>
+            <a:ext cx="9692640" cy="1078724"/>
+          </a:xfrm>
+        </p:spPr>
+        <p:txBody>
+          <a:bodyPr/>
+          <a:lstStyle/>
+          <a:p>
+            <a:r>
+              <a:rPr lang="en-US" dirty="0" smtClean="0"/>
+              <a:t>Payment Page design</a:t>
+            </a:r>
+            <a:endParaRPr lang="en-US" dirty="0"/>
+          </a:p>
+        </p:txBody>
+      </p:sp>
+      <p:pic>
+        <p:nvPicPr>
+          <p:cNvPr id="4" name="Content Placeholder 3"/>
+          <p:cNvPicPr>
+            <a:picLocks noGrp="1" noChangeAspect="1"/>
+          </p:cNvPicPr>
+          <p:nvPr>
+            <p:ph idx="1"/>
+          </p:nvPr>
+        </p:nvPicPr>
+        <p:blipFill>
+          <a:blip r:embed="rId2">
+            <a:extLst>
+              <a:ext uri="{28A0092B-C50C-407E-A947-70E740481C1C}">
+                <a14:useLocalDpi xmlns:a14="http://schemas.microsoft.com/office/drawing/2010/main" val="0"/>
+              </a:ext>
+            </a:extLst>
+          </a:blip>
+          <a:stretch>
+            <a:fillRect/>
+          </a:stretch>
+        </p:blipFill>
+        <p:spPr>
+          <a:xfrm>
+            <a:off x="2900001" y="946567"/>
+            <a:ext cx="6323512" cy="5909431"/>
+          </a:xfrm>
+        </p:spPr>
+      </p:pic>
+    </p:spTree>
+    <p:extLst>
+      <p:ext uri="{BB962C8B-B14F-4D97-AF65-F5344CB8AC3E}">
+        <p14:creationId xmlns:p14="http://schemas.microsoft.com/office/powerpoint/2010/main" val="1499937214"/>
+      </p:ext>
+    </p:extLst>
+  </p:cSld>
+  <p:clrMapOvr>
+    <a:masterClrMapping/>
+  </p:clrMapOvr>
+</p:sld>
+</file>
+
+<file path=ppt/slides/slide19.xml><?xml version="1.0" encoding="utf-8"?>
+<p:sld xmlns:a="http://schemas.openxmlformats.org/drawingml/2006/main" xmlns:r="http://schemas.openxmlformats.org/officeDocument/2006/relationships" xmlns:p="http://schemas.openxmlformats.org/presentationml/2006/main">
+  <p:cSld>
+    <p:spTree>
+      <p:nvGrpSpPr>
+        <p:cNvPr id="1" name=""/>
+        <p:cNvGrpSpPr/>
+        <p:nvPr/>
+      </p:nvGrpSpPr>
+      <p:grpSpPr>
+        <a:xfrm>
+          <a:off x="0" y="0"/>
+          <a:ext cx="0" cy="0"/>
+          <a:chOff x="0" y="0"/>
+          <a:chExt cx="0" cy="0"/>
+        </a:xfrm>
+      </p:grpSpPr>
+      <p:sp>
+        <p:nvSpPr>
+          <p:cNvPr id="2" name="Title 1"/>
+          <p:cNvSpPr>
+            <a:spLocks noGrp="1"/>
+          </p:cNvSpPr>
+          <p:nvPr>
+            <p:ph type="title"/>
+          </p:nvPr>
+        </p:nvSpPr>
+        <p:spPr>
+          <a:xfrm>
+            <a:off x="1261872" y="-5299"/>
+            <a:ext cx="9692640" cy="1325562"/>
+          </a:xfrm>
+        </p:spPr>
+        <p:txBody>
+          <a:bodyPr/>
+          <a:lstStyle/>
+          <a:p>
+            <a:r>
+              <a:rPr lang="en-US" dirty="0" smtClean="0"/>
+              <a:t>Payment History Design</a:t>
+            </a:r>
+            <a:endParaRPr lang="en-US" dirty="0"/>
+          </a:p>
+        </p:txBody>
+      </p:sp>
+      <p:pic>
+        <p:nvPicPr>
+          <p:cNvPr id="4" name="Content Placeholder 3"/>
+          <p:cNvPicPr>
+            <a:picLocks noGrp="1" noChangeAspect="1"/>
+          </p:cNvPicPr>
+          <p:nvPr>
+            <p:ph idx="1"/>
+          </p:nvPr>
+        </p:nvPicPr>
+        <p:blipFill>
+          <a:blip r:embed="rId2">
+            <a:extLst>
+              <a:ext uri="{28A0092B-C50C-407E-A947-70E740481C1C}">
+                <a14:useLocalDpi xmlns:a14="http://schemas.microsoft.com/office/drawing/2010/main" val="0"/>
+              </a:ext>
+            </a:extLst>
+          </a:blip>
+          <a:stretch>
+            <a:fillRect/>
+          </a:stretch>
+        </p:blipFill>
+        <p:spPr>
+          <a:xfrm>
+            <a:off x="1261872" y="1479289"/>
+            <a:ext cx="9429344" cy="5265738"/>
+          </a:xfrm>
+        </p:spPr>
+      </p:pic>
+    </p:spTree>
+    <p:extLst>
+      <p:ext uri="{BB962C8B-B14F-4D97-AF65-F5344CB8AC3E}">
+        <p14:creationId xmlns:p14="http://schemas.microsoft.com/office/powerpoint/2010/main" val="3912060336"/>
+      </p:ext>
+    </p:extLst>
+  </p:cSld>
+  <p:clrMapOvr>
+    <a:masterClrMapping/>
+  </p:clrMapOvr>
+</p:sld>
+</file>
+
 <file path=ppt/slides/slide2.xml><?xml version="1.0" encoding="utf-8"?>
 <p:sld xmlns:a="http://schemas.openxmlformats.org/drawingml/2006/main" xmlns:r="http://schemas.openxmlformats.org/officeDocument/2006/relationships" xmlns:p="http://schemas.openxmlformats.org/presentationml/2006/main">
   <p:cSld>
@@ -4520,16 +4696,7 @@
                 </a:solidFill>
                 <a:hlinkClick r:id="rId10" action="ppaction://hlinksldjump"/>
               </a:rPr>
-              <a:t>Customer </a:t>
-            </a:r>
-            <a:r>
-              <a:rPr lang="en-US" smtClean="0">
-                <a:solidFill>
-                  <a:srgbClr val="002060"/>
-                </a:solidFill>
-                <a:hlinkClick r:id="rId10" action="ppaction://hlinksldjump"/>
-              </a:rPr>
-              <a:t>Registration</a:t>
+              <a:t>Customer Registration</a:t>
             </a:r>
             <a:endParaRPr lang="en-US">
               <a:solidFill>
@@ -4849,6 +5016,7 @@
                 <a:solidFill>
                   <a:srgbClr val="002060"/>
                 </a:solidFill>
+                <a:hlinkClick r:id="rId3" action="ppaction://hlinksldjump"/>
               </a:rPr>
               <a:t>Place </a:t>
             </a:r>
@@ -4857,6 +5025,7 @@
                 <a:solidFill>
                   <a:srgbClr val="002060"/>
                 </a:solidFill>
+                <a:hlinkClick r:id="rId3" action="ppaction://hlinksldjump"/>
               </a:rPr>
               <a:t>Order </a:t>
             </a:r>
@@ -4865,9 +5034,201 @@
                 <a:solidFill>
                   <a:srgbClr val="002060"/>
                 </a:solidFill>
+                <a:hlinkClick r:id="rId3" action="ppaction://hlinksldjump"/>
               </a:rPr>
-              <a:t>Page Design</a:t>
-            </a:r>
+              <a:t>Page </a:t>
+            </a:r>
+            <a:r>
+              <a:rPr lang="en-US" dirty="0" smtClean="0">
+                <a:solidFill>
+                  <a:srgbClr val="002060"/>
+                </a:solidFill>
+                <a:hlinkClick r:id="rId3" action="ppaction://hlinksldjump"/>
+              </a:rPr>
+              <a:t>Design</a:t>
+            </a:r>
+            <a:endParaRPr lang="en-US" dirty="0" smtClean="0">
+              <a:solidFill>
+                <a:srgbClr val="002060"/>
+              </a:solidFill>
+            </a:endParaRPr>
+          </a:p>
+          <a:p>
+            <a:r>
+              <a:rPr lang="en-US" dirty="0" smtClean="0">
+                <a:solidFill>
+                  <a:srgbClr val="002060"/>
+                </a:solidFill>
+              </a:rPr>
+              <a:t>Payment Page </a:t>
+            </a:r>
+            <a:r>
+              <a:rPr lang="en-US" dirty="0">
+                <a:solidFill>
+                  <a:srgbClr val="002060"/>
+                </a:solidFill>
+              </a:rPr>
+              <a:t>Design</a:t>
+            </a:r>
+          </a:p>
+          <a:p>
+            <a:pPr lvl="1">
+              <a:lnSpc>
+                <a:spcPct val="100000"/>
+              </a:lnSpc>
+              <a:buSzPct val="80000"/>
+            </a:pPr>
+            <a:r>
+              <a:rPr lang="en-US" dirty="0" smtClean="0">
+                <a:solidFill>
+                  <a:srgbClr val="002060"/>
+                </a:solidFill>
+              </a:rPr>
+              <a:t>Payment Page</a:t>
+            </a:r>
+            <a:endParaRPr lang="en-US" dirty="0">
+              <a:solidFill>
+                <a:srgbClr val="002060"/>
+              </a:solidFill>
+            </a:endParaRPr>
+          </a:p>
+          <a:p>
+            <a:pPr lvl="1">
+              <a:lnSpc>
+                <a:spcPct val="100000"/>
+              </a:lnSpc>
+              <a:buSzPct val="80000"/>
+            </a:pPr>
+            <a:r>
+              <a:rPr lang="en-US" dirty="0" smtClean="0">
+                <a:solidFill>
+                  <a:srgbClr val="002060"/>
+                </a:solidFill>
+                <a:hlinkClick r:id="rId4" action="ppaction://hlinksldjump"/>
+              </a:rPr>
+              <a:t>Payment Page Design</a:t>
+            </a:r>
+            <a:endParaRPr lang="en-US" dirty="0" smtClean="0">
+              <a:solidFill>
+                <a:srgbClr val="002060"/>
+              </a:solidFill>
+            </a:endParaRPr>
+          </a:p>
+          <a:p>
+            <a:r>
+              <a:rPr lang="en-US" dirty="0">
+                <a:solidFill>
+                  <a:srgbClr val="002060"/>
+                </a:solidFill>
+              </a:rPr>
+              <a:t>Payment </a:t>
+            </a:r>
+            <a:r>
+              <a:rPr lang="en-US" dirty="0" smtClean="0">
+                <a:solidFill>
+                  <a:srgbClr val="002060"/>
+                </a:solidFill>
+              </a:rPr>
+              <a:t>History Page </a:t>
+            </a:r>
+            <a:r>
+              <a:rPr lang="en-US" dirty="0">
+                <a:solidFill>
+                  <a:srgbClr val="002060"/>
+                </a:solidFill>
+              </a:rPr>
+              <a:t>Design</a:t>
+            </a:r>
+          </a:p>
+          <a:p>
+            <a:pPr lvl="1">
+              <a:lnSpc>
+                <a:spcPct val="100000"/>
+              </a:lnSpc>
+              <a:buSzPct val="80000"/>
+            </a:pPr>
+            <a:r>
+              <a:rPr lang="en-US" dirty="0">
+                <a:solidFill>
+                  <a:srgbClr val="002060"/>
+                </a:solidFill>
+              </a:rPr>
+              <a:t>Payment </a:t>
+            </a:r>
+            <a:r>
+              <a:rPr lang="en-US" dirty="0" smtClean="0">
+                <a:solidFill>
+                  <a:srgbClr val="002060"/>
+                </a:solidFill>
+              </a:rPr>
+              <a:t>History Page</a:t>
+            </a:r>
+            <a:endParaRPr lang="en-US" dirty="0">
+              <a:solidFill>
+                <a:srgbClr val="002060"/>
+              </a:solidFill>
+            </a:endParaRPr>
+          </a:p>
+          <a:p>
+            <a:pPr lvl="1">
+              <a:lnSpc>
+                <a:spcPct val="100000"/>
+              </a:lnSpc>
+              <a:buSzPct val="80000"/>
+            </a:pPr>
+            <a:r>
+              <a:rPr lang="en-US" dirty="0">
+                <a:solidFill>
+                  <a:srgbClr val="002060"/>
+                </a:solidFill>
+                <a:hlinkClick r:id="rId5" action="ppaction://hlinksldjump"/>
+              </a:rPr>
+              <a:t>Payment </a:t>
+            </a:r>
+            <a:r>
+              <a:rPr lang="en-US" dirty="0" smtClean="0">
+                <a:solidFill>
+                  <a:srgbClr val="002060"/>
+                </a:solidFill>
+                <a:hlinkClick r:id="rId5" action="ppaction://hlinksldjump"/>
+              </a:rPr>
+              <a:t>History Page </a:t>
+            </a:r>
+            <a:r>
+              <a:rPr lang="en-US" dirty="0">
+                <a:solidFill>
+                  <a:srgbClr val="002060"/>
+                </a:solidFill>
+                <a:hlinkClick r:id="rId5" action="ppaction://hlinksldjump"/>
+              </a:rPr>
+              <a:t>Design</a:t>
+            </a:r>
+            <a:endParaRPr lang="en-US" dirty="0">
+              <a:solidFill>
+                <a:srgbClr val="002060"/>
+              </a:solidFill>
+            </a:endParaRPr>
+          </a:p>
+          <a:p>
+            <a:pPr lvl="1">
+              <a:lnSpc>
+                <a:spcPct val="100000"/>
+              </a:lnSpc>
+              <a:buSzPct val="80000"/>
+            </a:pPr>
+            <a:endParaRPr lang="en-US" dirty="0">
+              <a:solidFill>
+                <a:srgbClr val="002060"/>
+              </a:solidFill>
+            </a:endParaRPr>
+          </a:p>
+          <a:p>
+            <a:pPr lvl="1">
+              <a:lnSpc>
+                <a:spcPct val="100000"/>
+              </a:lnSpc>
+              <a:buSzPct val="80000"/>
+            </a:pPr>
             <a:endParaRPr lang="en-US" dirty="0">
               <a:solidFill>
                 <a:srgbClr val="002060"/>

</xml_diff>